<commit_message>
working sicb figures moving to top 25% strategies
</commit_message>
<xml_diff>
--- a/SICB/SICB2025.pptx
+++ b/SICB/SICB2025.pptx
@@ -5,7 +5,7 @@
     <p:sldMasterId id="2147483648" r:id="rId1"/>
   </p:sldMasterIdLst>
   <p:notesMasterIdLst>
-    <p:notesMasterId r:id="rId18"/>
+    <p:notesMasterId r:id="rId25"/>
   </p:notesMasterIdLst>
   <p:sldIdLst>
     <p:sldId id="256" r:id="rId2"/>
@@ -22,8 +22,15 @@
     <p:sldId id="270" r:id="rId13"/>
     <p:sldId id="271" r:id="rId14"/>
     <p:sldId id="285" r:id="rId15"/>
-    <p:sldId id="273" r:id="rId16"/>
-    <p:sldId id="274" r:id="rId17"/>
+    <p:sldId id="287" r:id="rId16"/>
+    <p:sldId id="288" r:id="rId17"/>
+    <p:sldId id="289" r:id="rId18"/>
+    <p:sldId id="290" r:id="rId19"/>
+    <p:sldId id="291" r:id="rId20"/>
+    <p:sldId id="292" r:id="rId21"/>
+    <p:sldId id="294" r:id="rId22"/>
+    <p:sldId id="295" r:id="rId23"/>
+    <p:sldId id="296" r:id="rId24"/>
   </p:sldIdLst>
   <p:sldSz cx="12192000" cy="6858000"/>
   <p:notesSz cx="6858000" cy="9144000"/>
@@ -141,8 +148,15 @@
             <p14:sldId id="270"/>
             <p14:sldId id="271"/>
             <p14:sldId id="285"/>
-            <p14:sldId id="273"/>
-            <p14:sldId id="274"/>
+            <p14:sldId id="287"/>
+            <p14:sldId id="288"/>
+            <p14:sldId id="289"/>
+            <p14:sldId id="290"/>
+            <p14:sldId id="291"/>
+            <p14:sldId id="292"/>
+            <p14:sldId id="294"/>
+            <p14:sldId id="295"/>
+            <p14:sldId id="296"/>
           </p14:sldIdLst>
         </p14:section>
       </p14:sectionLst>
@@ -4420,10 +4434,10 @@
       </p:grpSpPr>
       <p:pic>
         <p:nvPicPr>
-          <p:cNvPr id="4" name="Picture 3" descr="A graph of a graph of success&#10;&#10;Description automatically generated">
-            <a:extLst>
-              <a:ext uri="{FF2B5EF4-FFF2-40B4-BE49-F238E27FC236}">
-                <a16:creationId xmlns:a16="http://schemas.microsoft.com/office/drawing/2014/main" id="{F4E2032D-6C2B-E48A-E257-123403AE7BBE}"/>
+          <p:cNvPr id="3" name="Picture 2" descr="A graph of success in regular environment&#10;&#10;Description automatically generated">
+            <a:extLst>
+              <a:ext uri="{FF2B5EF4-FFF2-40B4-BE49-F238E27FC236}">
+                <a16:creationId xmlns:a16="http://schemas.microsoft.com/office/drawing/2014/main" id="{F0FA5A7B-7CB2-55CE-2E7F-15969AC9184A}"/>
               </a:ext>
             </a:extLst>
           </p:cNvPr>
@@ -4446,8 +4460,8 @@
         </p:blipFill>
         <p:spPr>
           <a:xfrm>
-            <a:off x="3809995" y="1142995"/>
-            <a:ext cx="4572009" cy="4572009"/>
+            <a:off x="2895593" y="1600196"/>
+            <a:ext cx="6400813" cy="3657607"/>
           </a:xfrm>
           <a:prstGeom prst="rect">
             <a:avLst/>
@@ -4457,7 +4471,7 @@
     </p:spTree>
     <p:extLst>
       <p:ext uri="{BB962C8B-B14F-4D97-AF65-F5344CB8AC3E}">
-        <p14:creationId xmlns:p14="http://schemas.microsoft.com/office/powerpoint/2010/main" val="51682555"/>
+        <p14:creationId xmlns:p14="http://schemas.microsoft.com/office/powerpoint/2010/main" val="317393151"/>
       </p:ext>
     </p:extLst>
   </p:cSld>
@@ -4486,10 +4500,10 @@
       </p:grpSpPr>
       <p:pic>
         <p:nvPicPr>
-          <p:cNvPr id="3" name="Picture 2" descr="A graph of a graph with dots&#10;&#10;Description automatically generated">
-            <a:extLst>
-              <a:ext uri="{FF2B5EF4-FFF2-40B4-BE49-F238E27FC236}">
-                <a16:creationId xmlns:a16="http://schemas.microsoft.com/office/drawing/2014/main" id="{144A772B-BB47-D440-F95C-08F7EB4494AB}"/>
+          <p:cNvPr id="5" name="Picture 4" descr="A graph of growth and progress&#10;&#10;Description automatically generated with medium confidence">
+            <a:extLst>
+              <a:ext uri="{FF2B5EF4-FFF2-40B4-BE49-F238E27FC236}">
+                <a16:creationId xmlns:a16="http://schemas.microsoft.com/office/drawing/2014/main" id="{DBA6D59E-51F9-E5B9-D2F1-396A325B42CB}"/>
               </a:ext>
             </a:extLst>
           </p:cNvPr>
@@ -4512,8 +4526,8 @@
         </p:blipFill>
         <p:spPr>
           <a:xfrm>
-            <a:off x="3809995" y="1142995"/>
-            <a:ext cx="4572009" cy="4572009"/>
+            <a:off x="2895593" y="1600196"/>
+            <a:ext cx="6400813" cy="3657607"/>
           </a:xfrm>
           <a:prstGeom prst="rect">
             <a:avLst/>
@@ -4523,7 +4537,205 @@
     </p:spTree>
     <p:extLst>
       <p:ext uri="{BB962C8B-B14F-4D97-AF65-F5344CB8AC3E}">
-        <p14:creationId xmlns:p14="http://schemas.microsoft.com/office/powerpoint/2010/main" val="2742734528"/>
+        <p14:creationId xmlns:p14="http://schemas.microsoft.com/office/powerpoint/2010/main" val="1207003560"/>
+      </p:ext>
+    </p:extLst>
+  </p:cSld>
+  <p:clrMapOvr>
+    <a:masterClrMapping/>
+  </p:clrMapOvr>
+</p:sld>
+</file>
+
+<file path=ppt/slides/slide17.xml><?xml version="1.0" encoding="utf-8"?>
+<p:sld xmlns:a="http://schemas.openxmlformats.org/drawingml/2006/main" xmlns:r="http://schemas.openxmlformats.org/officeDocument/2006/relationships" xmlns:p="http://schemas.openxmlformats.org/presentationml/2006/main">
+  <p:cSld>
+    <p:spTree>
+      <p:nvGrpSpPr>
+        <p:cNvPr id="1" name=""/>
+        <p:cNvGrpSpPr/>
+        <p:nvPr/>
+      </p:nvGrpSpPr>
+      <p:grpSpPr>
+        <a:xfrm>
+          <a:off x="0" y="0"/>
+          <a:ext cx="0" cy="0"/>
+          <a:chOff x="0" y="0"/>
+          <a:chExt cx="0" cy="0"/>
+        </a:xfrm>
+      </p:grpSpPr>
+      <p:pic>
+        <p:nvPicPr>
+          <p:cNvPr id="9" name="Picture 8" descr="A line of smoke from a plane&#10;&#10;Description automatically generated with medium confidence">
+            <a:extLst>
+              <a:ext uri="{FF2B5EF4-FFF2-40B4-BE49-F238E27FC236}">
+                <a16:creationId xmlns:a16="http://schemas.microsoft.com/office/drawing/2014/main" id="{22DC32AC-8C0D-0223-4F8F-AA6A05A165EA}"/>
+              </a:ext>
+            </a:extLst>
+          </p:cNvPr>
+          <p:cNvPicPr>
+            <a:picLocks noChangeAspect="1"/>
+          </p:cNvPicPr>
+          <p:nvPr/>
+        </p:nvPicPr>
+        <p:blipFill>
+          <a:blip r:embed="rId2">
+            <a:extLst>
+              <a:ext uri="{28A0092B-C50C-407E-A947-70E740481C1C}">
+                <a14:useLocalDpi xmlns:a14="http://schemas.microsoft.com/office/drawing/2010/main" val="0"/>
+              </a:ext>
+            </a:extLst>
+          </a:blip>
+          <a:stretch>
+            <a:fillRect/>
+          </a:stretch>
+        </p:blipFill>
+        <p:spPr>
+          <a:xfrm>
+            <a:off x="2895593" y="1600196"/>
+            <a:ext cx="6400813" cy="3657607"/>
+          </a:xfrm>
+          <a:prstGeom prst="rect">
+            <a:avLst/>
+          </a:prstGeom>
+        </p:spPr>
+      </p:pic>
+    </p:spTree>
+    <p:extLst>
+      <p:ext uri="{BB962C8B-B14F-4D97-AF65-F5344CB8AC3E}">
+        <p14:creationId xmlns:p14="http://schemas.microsoft.com/office/powerpoint/2010/main" val="3352682201"/>
+      </p:ext>
+    </p:extLst>
+  </p:cSld>
+  <p:clrMapOvr>
+    <a:masterClrMapping/>
+  </p:clrMapOvr>
+</p:sld>
+</file>
+
+<file path=ppt/slides/slide18.xml><?xml version="1.0" encoding="utf-8"?>
+<p:sld xmlns:a="http://schemas.openxmlformats.org/drawingml/2006/main" xmlns:r="http://schemas.openxmlformats.org/officeDocument/2006/relationships" xmlns:p="http://schemas.openxmlformats.org/presentationml/2006/main">
+  <p:cSld>
+    <p:spTree>
+      <p:nvGrpSpPr>
+        <p:cNvPr id="1" name=""/>
+        <p:cNvGrpSpPr/>
+        <p:nvPr/>
+      </p:nvGrpSpPr>
+      <p:grpSpPr>
+        <a:xfrm>
+          <a:off x="0" y="0"/>
+          <a:ext cx="0" cy="0"/>
+          <a:chOff x="0" y="0"/>
+          <a:chExt cx="0" cy="0"/>
+        </a:xfrm>
+      </p:grpSpPr>
+      <p:pic>
+        <p:nvPicPr>
+          <p:cNvPr id="17" name="Picture 16" descr="A black line in the air&#10;&#10;Description automatically generated">
+            <a:extLst>
+              <a:ext uri="{FF2B5EF4-FFF2-40B4-BE49-F238E27FC236}">
+                <a16:creationId xmlns:a16="http://schemas.microsoft.com/office/drawing/2014/main" id="{CDD4C940-C36D-84DB-7039-F758EE51F696}"/>
+              </a:ext>
+            </a:extLst>
+          </p:cNvPr>
+          <p:cNvPicPr>
+            <a:picLocks noChangeAspect="1"/>
+          </p:cNvPicPr>
+          <p:nvPr/>
+        </p:nvPicPr>
+        <p:blipFill>
+          <a:blip r:embed="rId2">
+            <a:extLst>
+              <a:ext uri="{28A0092B-C50C-407E-A947-70E740481C1C}">
+                <a14:useLocalDpi xmlns:a14="http://schemas.microsoft.com/office/drawing/2010/main" val="0"/>
+              </a:ext>
+            </a:extLst>
+          </a:blip>
+          <a:stretch>
+            <a:fillRect/>
+          </a:stretch>
+        </p:blipFill>
+        <p:spPr>
+          <a:xfrm>
+            <a:off x="2895593" y="1600196"/>
+            <a:ext cx="6400813" cy="3657607"/>
+          </a:xfrm>
+          <a:prstGeom prst="rect">
+            <a:avLst/>
+          </a:prstGeom>
+        </p:spPr>
+      </p:pic>
+    </p:spTree>
+    <p:extLst>
+      <p:ext uri="{BB962C8B-B14F-4D97-AF65-F5344CB8AC3E}">
+        <p14:creationId xmlns:p14="http://schemas.microsoft.com/office/powerpoint/2010/main" val="2871201672"/>
+      </p:ext>
+    </p:extLst>
+  </p:cSld>
+  <p:clrMapOvr>
+    <a:masterClrMapping/>
+  </p:clrMapOvr>
+</p:sld>
+</file>
+
+<file path=ppt/slides/slide19.xml><?xml version="1.0" encoding="utf-8"?>
+<p:sld xmlns:a="http://schemas.openxmlformats.org/drawingml/2006/main" xmlns:r="http://schemas.openxmlformats.org/officeDocument/2006/relationships" xmlns:p="http://schemas.openxmlformats.org/presentationml/2006/main">
+  <p:cSld>
+    <p:spTree>
+      <p:nvGrpSpPr>
+        <p:cNvPr id="1" name=""/>
+        <p:cNvGrpSpPr/>
+        <p:nvPr/>
+      </p:nvGrpSpPr>
+      <p:grpSpPr>
+        <a:xfrm>
+          <a:off x="0" y="0"/>
+          <a:ext cx="0" cy="0"/>
+          <a:chOff x="0" y="0"/>
+          <a:chExt cx="0" cy="0"/>
+        </a:xfrm>
+      </p:grpSpPr>
+      <p:pic>
+        <p:nvPicPr>
+          <p:cNvPr id="5" name="Picture 4" descr="A diagram of a graph&#10;&#10;Description automatically generated with medium confidence">
+            <a:extLst>
+              <a:ext uri="{FF2B5EF4-FFF2-40B4-BE49-F238E27FC236}">
+                <a16:creationId xmlns:a16="http://schemas.microsoft.com/office/drawing/2014/main" id="{DA6B11EF-4CCD-8A99-2A59-D554F75488AA}"/>
+              </a:ext>
+            </a:extLst>
+          </p:cNvPr>
+          <p:cNvPicPr>
+            <a:picLocks noChangeAspect="1"/>
+          </p:cNvPicPr>
+          <p:nvPr/>
+        </p:nvPicPr>
+        <p:blipFill>
+          <a:blip r:embed="rId2">
+            <a:extLst>
+              <a:ext uri="{28A0092B-C50C-407E-A947-70E740481C1C}">
+                <a14:useLocalDpi xmlns:a14="http://schemas.microsoft.com/office/drawing/2010/main" val="0"/>
+              </a:ext>
+            </a:extLst>
+          </a:blip>
+          <a:stretch>
+            <a:fillRect/>
+          </a:stretch>
+        </p:blipFill>
+        <p:spPr>
+          <a:xfrm>
+            <a:off x="2895593" y="1600196"/>
+            <a:ext cx="6400813" cy="3657607"/>
+          </a:xfrm>
+          <a:prstGeom prst="rect">
+            <a:avLst/>
+          </a:prstGeom>
+        </p:spPr>
+      </p:pic>
+    </p:spTree>
+    <p:extLst>
+      <p:ext uri="{BB962C8B-B14F-4D97-AF65-F5344CB8AC3E}">
+        <p14:creationId xmlns:p14="http://schemas.microsoft.com/office/powerpoint/2010/main" val="2604940391"/>
       </p:ext>
     </p:extLst>
   </p:cSld>
@@ -4665,6 +4877,292 @@
     <p:extLst>
       <p:ext uri="{BB962C8B-B14F-4D97-AF65-F5344CB8AC3E}">
         <p14:creationId xmlns:p14="http://schemas.microsoft.com/office/powerpoint/2010/main" val="2923422350"/>
+      </p:ext>
+    </p:extLst>
+  </p:cSld>
+  <p:clrMapOvr>
+    <a:masterClrMapping/>
+  </p:clrMapOvr>
+</p:sld>
+</file>
+
+<file path=ppt/slides/slide20.xml><?xml version="1.0" encoding="utf-8"?>
+<p:sld xmlns:a="http://schemas.openxmlformats.org/drawingml/2006/main" xmlns:r="http://schemas.openxmlformats.org/officeDocument/2006/relationships" xmlns:p="http://schemas.openxmlformats.org/presentationml/2006/main">
+  <p:cSld>
+    <p:spTree>
+      <p:nvGrpSpPr>
+        <p:cNvPr id="1" name=""/>
+        <p:cNvGrpSpPr/>
+        <p:nvPr/>
+      </p:nvGrpSpPr>
+      <p:grpSpPr>
+        <a:xfrm>
+          <a:off x="0" y="0"/>
+          <a:ext cx="0" cy="0"/>
+          <a:chOff x="0" y="0"/>
+          <a:chExt cx="0" cy="0"/>
+        </a:xfrm>
+      </p:grpSpPr>
+      <p:pic>
+        <p:nvPicPr>
+          <p:cNvPr id="5" name="Picture 4" descr="A graph with dots and lines&#10;&#10;Description automatically generated">
+            <a:extLst>
+              <a:ext uri="{FF2B5EF4-FFF2-40B4-BE49-F238E27FC236}">
+                <a16:creationId xmlns:a16="http://schemas.microsoft.com/office/drawing/2014/main" id="{FBF097AA-AACB-E41A-F8C9-5A3FA7E3A231}"/>
+              </a:ext>
+            </a:extLst>
+          </p:cNvPr>
+          <p:cNvPicPr>
+            <a:picLocks noChangeAspect="1"/>
+          </p:cNvPicPr>
+          <p:nvPr/>
+        </p:nvPicPr>
+        <p:blipFill>
+          <a:blip r:embed="rId2">
+            <a:extLst>
+              <a:ext uri="{28A0092B-C50C-407E-A947-70E740481C1C}">
+                <a14:useLocalDpi xmlns:a14="http://schemas.microsoft.com/office/drawing/2010/main" val="0"/>
+              </a:ext>
+            </a:extLst>
+          </a:blip>
+          <a:stretch>
+            <a:fillRect/>
+          </a:stretch>
+        </p:blipFill>
+        <p:spPr>
+          <a:xfrm>
+            <a:off x="3809995" y="1600196"/>
+            <a:ext cx="4572009" cy="3657607"/>
+          </a:xfrm>
+          <a:prstGeom prst="rect">
+            <a:avLst/>
+          </a:prstGeom>
+        </p:spPr>
+      </p:pic>
+    </p:spTree>
+    <p:extLst>
+      <p:ext uri="{BB962C8B-B14F-4D97-AF65-F5344CB8AC3E}">
+        <p14:creationId xmlns:p14="http://schemas.microsoft.com/office/powerpoint/2010/main" val="3223323773"/>
+      </p:ext>
+    </p:extLst>
+  </p:cSld>
+  <p:clrMapOvr>
+    <a:masterClrMapping/>
+  </p:clrMapOvr>
+</p:sld>
+</file>
+
+<file path=ppt/slides/slide21.xml><?xml version="1.0" encoding="utf-8"?>
+<p:sld xmlns:a="http://schemas.openxmlformats.org/drawingml/2006/main" xmlns:r="http://schemas.openxmlformats.org/officeDocument/2006/relationships" xmlns:p="http://schemas.openxmlformats.org/presentationml/2006/main">
+  <p:cSld>
+    <p:spTree>
+      <p:nvGrpSpPr>
+        <p:cNvPr id="1" name="">
+          <a:extLst>
+            <a:ext uri="{FF2B5EF4-FFF2-40B4-BE49-F238E27FC236}">
+              <a16:creationId xmlns:a16="http://schemas.microsoft.com/office/drawing/2014/main" id="{63F052C4-B740-3B75-4EE3-2F4EEA218213}"/>
+            </a:ext>
+          </a:extLst>
+        </p:cNvPr>
+        <p:cNvGrpSpPr/>
+        <p:nvPr/>
+      </p:nvGrpSpPr>
+      <p:grpSpPr>
+        <a:xfrm>
+          <a:off x="0" y="0"/>
+          <a:ext cx="0" cy="0"/>
+          <a:chOff x="0" y="0"/>
+          <a:chExt cx="0" cy="0"/>
+        </a:xfrm>
+      </p:grpSpPr>
+      <p:pic>
+        <p:nvPicPr>
+          <p:cNvPr id="3" name="Picture 2" descr="A graph of a graph&#10;&#10;Description automatically generated">
+            <a:extLst>
+              <a:ext uri="{FF2B5EF4-FFF2-40B4-BE49-F238E27FC236}">
+                <a16:creationId xmlns:a16="http://schemas.microsoft.com/office/drawing/2014/main" id="{21623C33-E24C-1596-4B88-8289AD96F518}"/>
+              </a:ext>
+            </a:extLst>
+          </p:cNvPr>
+          <p:cNvPicPr>
+            <a:picLocks noChangeAspect="1"/>
+          </p:cNvPicPr>
+          <p:nvPr/>
+        </p:nvPicPr>
+        <p:blipFill>
+          <a:blip r:embed="rId2">
+            <a:extLst>
+              <a:ext uri="{28A0092B-C50C-407E-A947-70E740481C1C}">
+                <a14:useLocalDpi xmlns:a14="http://schemas.microsoft.com/office/drawing/2010/main" val="0"/>
+              </a:ext>
+            </a:extLst>
+          </a:blip>
+          <a:stretch>
+            <a:fillRect/>
+          </a:stretch>
+        </p:blipFill>
+        <p:spPr>
+          <a:xfrm>
+            <a:off x="643467" y="1247985"/>
+            <a:ext cx="10905066" cy="4362028"/>
+          </a:xfrm>
+          <a:prstGeom prst="rect">
+            <a:avLst/>
+          </a:prstGeom>
+        </p:spPr>
+      </p:pic>
+    </p:spTree>
+    <p:extLst>
+      <p:ext uri="{BB962C8B-B14F-4D97-AF65-F5344CB8AC3E}">
+        <p14:creationId xmlns:p14="http://schemas.microsoft.com/office/powerpoint/2010/main" val="981264521"/>
+      </p:ext>
+    </p:extLst>
+  </p:cSld>
+  <p:clrMapOvr>
+    <a:masterClrMapping/>
+  </p:clrMapOvr>
+</p:sld>
+</file>
+
+<file path=ppt/slides/slide22.xml><?xml version="1.0" encoding="utf-8"?>
+<p:sld xmlns:a="http://schemas.openxmlformats.org/drawingml/2006/main" xmlns:r="http://schemas.openxmlformats.org/officeDocument/2006/relationships" xmlns:p="http://schemas.openxmlformats.org/presentationml/2006/main">
+  <p:cSld>
+    <p:bg>
+      <p:bgPr>
+        <a:solidFill>
+          <a:schemeClr val="bg1"/>
+        </a:solidFill>
+        <a:effectLst/>
+      </p:bgPr>
+    </p:bg>
+    <p:spTree>
+      <p:nvGrpSpPr>
+        <p:cNvPr id="1" name=""/>
+        <p:cNvGrpSpPr/>
+        <p:nvPr/>
+      </p:nvGrpSpPr>
+      <p:grpSpPr>
+        <a:xfrm>
+          <a:off x="0" y="0"/>
+          <a:ext cx="0" cy="0"/>
+          <a:chOff x="0" y="0"/>
+          <a:chExt cx="0" cy="0"/>
+        </a:xfrm>
+      </p:grpSpPr>
+      <p:pic>
+        <p:nvPicPr>
+          <p:cNvPr id="3" name="Picture 2" descr="A graph of a graph&#10;&#10;Description automatically generated with medium confidence">
+            <a:extLst>
+              <a:ext uri="{FF2B5EF4-FFF2-40B4-BE49-F238E27FC236}">
+                <a16:creationId xmlns:a16="http://schemas.microsoft.com/office/drawing/2014/main" id="{1299CAF1-FA48-1D69-50A8-5A04A2B776A0}"/>
+              </a:ext>
+            </a:extLst>
+          </p:cNvPr>
+          <p:cNvPicPr>
+            <a:picLocks noChangeAspect="1"/>
+          </p:cNvPicPr>
+          <p:nvPr/>
+        </p:nvPicPr>
+        <p:blipFill>
+          <a:blip r:embed="rId2">
+            <a:extLst>
+              <a:ext uri="{28A0092B-C50C-407E-A947-70E740481C1C}">
+                <a14:useLocalDpi xmlns:a14="http://schemas.microsoft.com/office/drawing/2010/main" val="0"/>
+              </a:ext>
+            </a:extLst>
+          </a:blip>
+          <a:stretch>
+            <a:fillRect/>
+          </a:stretch>
+        </p:blipFill>
+        <p:spPr>
+          <a:xfrm>
+            <a:off x="643467" y="1247985"/>
+            <a:ext cx="10905066" cy="4362028"/>
+          </a:xfrm>
+          <a:prstGeom prst="rect">
+            <a:avLst/>
+          </a:prstGeom>
+        </p:spPr>
+      </p:pic>
+    </p:spTree>
+    <p:extLst>
+      <p:ext uri="{BB962C8B-B14F-4D97-AF65-F5344CB8AC3E}">
+        <p14:creationId xmlns:p14="http://schemas.microsoft.com/office/powerpoint/2010/main" val="572464560"/>
+      </p:ext>
+    </p:extLst>
+  </p:cSld>
+  <p:clrMapOvr>
+    <a:masterClrMapping/>
+  </p:clrMapOvr>
+</p:sld>
+</file>
+
+<file path=ppt/slides/slide23.xml><?xml version="1.0" encoding="utf-8"?>
+<p:sld xmlns:a="http://schemas.openxmlformats.org/drawingml/2006/main" xmlns:r="http://schemas.openxmlformats.org/officeDocument/2006/relationships" xmlns:p="http://schemas.openxmlformats.org/presentationml/2006/main">
+  <p:cSld>
+    <p:bg>
+      <p:bgPr>
+        <a:solidFill>
+          <a:schemeClr val="bg1"/>
+        </a:solidFill>
+        <a:effectLst/>
+      </p:bgPr>
+    </p:bg>
+    <p:spTree>
+      <p:nvGrpSpPr>
+        <p:cNvPr id="1" name=""/>
+        <p:cNvGrpSpPr/>
+        <p:nvPr/>
+      </p:nvGrpSpPr>
+      <p:grpSpPr>
+        <a:xfrm>
+          <a:off x="0" y="0"/>
+          <a:ext cx="0" cy="0"/>
+          <a:chOff x="0" y="0"/>
+          <a:chExt cx="0" cy="0"/>
+        </a:xfrm>
+      </p:grpSpPr>
+      <p:pic>
+        <p:nvPicPr>
+          <p:cNvPr id="3" name="Picture 2" descr="A graph with lines and numbers&#10;&#10;Description automatically generated">
+            <a:extLst>
+              <a:ext uri="{FF2B5EF4-FFF2-40B4-BE49-F238E27FC236}">
+                <a16:creationId xmlns:a16="http://schemas.microsoft.com/office/drawing/2014/main" id="{8B03AB49-15B7-9EB1-9AAA-DD4D97E3B81A}"/>
+              </a:ext>
+            </a:extLst>
+          </p:cNvPr>
+          <p:cNvPicPr>
+            <a:picLocks noChangeAspect="1"/>
+          </p:cNvPicPr>
+          <p:nvPr/>
+        </p:nvPicPr>
+        <p:blipFill>
+          <a:blip r:embed="rId2">
+            <a:extLst>
+              <a:ext uri="{28A0092B-C50C-407E-A947-70E740481C1C}">
+                <a14:useLocalDpi xmlns:a14="http://schemas.microsoft.com/office/drawing/2010/main" val="0"/>
+              </a:ext>
+            </a:extLst>
+          </a:blip>
+          <a:stretch>
+            <a:fillRect/>
+          </a:stretch>
+        </p:blipFill>
+        <p:spPr>
+          <a:xfrm>
+            <a:off x="643467" y="1247985"/>
+            <a:ext cx="10905066" cy="4362028"/>
+          </a:xfrm>
+          <a:prstGeom prst="rect">
+            <a:avLst/>
+          </a:prstGeom>
+        </p:spPr>
+      </p:pic>
+    </p:spTree>
+    <p:extLst>
+      <p:ext uri="{BB962C8B-B14F-4D97-AF65-F5344CB8AC3E}">
+        <p14:creationId xmlns:p14="http://schemas.microsoft.com/office/powerpoint/2010/main" val="1192567665"/>
       </p:ext>
     </p:extLst>
   </p:cSld>

</xml_diff>

<commit_message>
sicb working, just variation in strategies left. TODO individual strategies successful, or pairs? Variation in STRATEGIES across environments, or variation in COMBOS across envs bigger? Also, run breeding season model with only one parent initialized to look at success of different strategies for F across all envs
</commit_message>
<xml_diff>
--- a/SICB/SICB2025.pptx
+++ b/SICB/SICB2025.pptx
@@ -5,32 +5,31 @@
     <p:sldMasterId id="2147483648" r:id="rId1"/>
   </p:sldMasterIdLst>
   <p:notesMasterIdLst>
-    <p:notesMasterId r:id="rId25"/>
+    <p:notesMasterId r:id="rId24"/>
   </p:notesMasterIdLst>
   <p:sldIdLst>
-    <p:sldId id="256" r:id="rId2"/>
-    <p:sldId id="280" r:id="rId3"/>
-    <p:sldId id="276" r:id="rId4"/>
-    <p:sldId id="279" r:id="rId5"/>
-    <p:sldId id="278" r:id="rId6"/>
-    <p:sldId id="281" r:id="rId7"/>
-    <p:sldId id="282" r:id="rId8"/>
-    <p:sldId id="284" r:id="rId9"/>
-    <p:sldId id="268" r:id="rId10"/>
-    <p:sldId id="283" r:id="rId11"/>
-    <p:sldId id="269" r:id="rId12"/>
-    <p:sldId id="270" r:id="rId13"/>
-    <p:sldId id="271" r:id="rId14"/>
-    <p:sldId id="285" r:id="rId15"/>
-    <p:sldId id="287" r:id="rId16"/>
-    <p:sldId id="288" r:id="rId17"/>
-    <p:sldId id="289" r:id="rId18"/>
-    <p:sldId id="290" r:id="rId19"/>
-    <p:sldId id="291" r:id="rId20"/>
-    <p:sldId id="292" r:id="rId21"/>
-    <p:sldId id="294" r:id="rId22"/>
-    <p:sldId id="295" r:id="rId23"/>
-    <p:sldId id="296" r:id="rId24"/>
+    <p:sldId id="300" r:id="rId2"/>
+    <p:sldId id="302" r:id="rId3"/>
+    <p:sldId id="256" r:id="rId4"/>
+    <p:sldId id="280" r:id="rId5"/>
+    <p:sldId id="304" r:id="rId6"/>
+    <p:sldId id="282" r:id="rId7"/>
+    <p:sldId id="297" r:id="rId8"/>
+    <p:sldId id="285" r:id="rId9"/>
+    <p:sldId id="305" r:id="rId10"/>
+    <p:sldId id="298" r:id="rId11"/>
+    <p:sldId id="309" r:id="rId12"/>
+    <p:sldId id="308" r:id="rId13"/>
+    <p:sldId id="299" r:id="rId14"/>
+    <p:sldId id="306" r:id="rId15"/>
+    <p:sldId id="284" r:id="rId16"/>
+    <p:sldId id="268" r:id="rId17"/>
+    <p:sldId id="307" r:id="rId18"/>
+    <p:sldId id="269" r:id="rId19"/>
+    <p:sldId id="270" r:id="rId20"/>
+    <p:sldId id="294" r:id="rId21"/>
+    <p:sldId id="295" r:id="rId22"/>
+    <p:sldId id="296" r:id="rId23"/>
   </p:sldIdLst>
   <p:sldSz cx="12192000" cy="6858000"/>
   <p:notesSz cx="6858000" cy="9144000"/>
@@ -134,26 +133,25 @@
       <p14:sectionLst xmlns:p14="http://schemas.microsoft.com/office/powerpoint/2010/main">
         <p14:section name="Default Section" id="{CB9A2429-BB04-4327-8B60-27B2BF40770D}">
           <p14:sldIdLst>
+            <p14:sldId id="300"/>
+            <p14:sldId id="302"/>
             <p14:sldId id="256"/>
             <p14:sldId id="280"/>
-            <p14:sldId id="276"/>
-            <p14:sldId id="279"/>
-            <p14:sldId id="278"/>
-            <p14:sldId id="281"/>
+            <p14:sldId id="304"/>
             <p14:sldId id="282"/>
+            <p14:sldId id="297"/>
+            <p14:sldId id="285"/>
+            <p14:sldId id="305"/>
+            <p14:sldId id="298"/>
+            <p14:sldId id="309"/>
+            <p14:sldId id="308"/>
+            <p14:sldId id="299"/>
+            <p14:sldId id="306"/>
             <p14:sldId id="284"/>
             <p14:sldId id="268"/>
-            <p14:sldId id="283"/>
+            <p14:sldId id="307"/>
             <p14:sldId id="269"/>
             <p14:sldId id="270"/>
-            <p14:sldId id="271"/>
-            <p14:sldId id="285"/>
-            <p14:sldId id="287"/>
-            <p14:sldId id="288"/>
-            <p14:sldId id="289"/>
-            <p14:sldId id="290"/>
-            <p14:sldId id="291"/>
-            <p14:sldId id="292"/>
             <p14:sldId id="294"/>
             <p14:sldId id="295"/>
             <p14:sldId id="296"/>
@@ -250,7 +248,7 @@
           <a:p>
             <a:fld id="{7BD143C5-AA8C-4920-BD2C-B4B9239CEEBC}" type="datetimeFigureOut">
               <a:rPr lang="en-US" smtClean="0"/>
-              <a:t>12/18/2024</a:t>
+              <a:t>12/19/2024</a:t>
             </a:fld>
             <a:endParaRPr lang="en-US"/>
           </a:p>
@@ -522,90 +520,6 @@
   <p:cSld>
     <p:spTree>
       <p:nvGrpSpPr>
-        <p:cNvPr id="1" name=""/>
-        <p:cNvGrpSpPr/>
-        <p:nvPr/>
-      </p:nvGrpSpPr>
-      <p:grpSpPr>
-        <a:xfrm>
-          <a:off x="0" y="0"/>
-          <a:ext cx="0" cy="0"/>
-          <a:chOff x="0" y="0"/>
-          <a:chExt cx="0" cy="0"/>
-        </a:xfrm>
-      </p:grpSpPr>
-      <p:sp>
-        <p:nvSpPr>
-          <p:cNvPr id="2" name="Slide Image Placeholder 1"/>
-          <p:cNvSpPr>
-            <a:spLocks noGrp="1" noRot="1" noChangeAspect="1"/>
-          </p:cNvSpPr>
-          <p:nvPr>
-            <p:ph type="sldImg"/>
-          </p:nvPr>
-        </p:nvSpPr>
-        <p:spPr/>
-      </p:sp>
-      <p:sp>
-        <p:nvSpPr>
-          <p:cNvPr id="3" name="Notes Placeholder 2"/>
-          <p:cNvSpPr>
-            <a:spLocks noGrp="1"/>
-          </p:cNvSpPr>
-          <p:nvPr>
-            <p:ph type="body" idx="1"/>
-          </p:nvPr>
-        </p:nvSpPr>
-        <p:spPr/>
-        <p:txBody>
-          <a:bodyPr/>
-          <a:lstStyle/>
-          <a:p>
-            <a:endParaRPr lang="en-US" dirty="0"/>
-          </a:p>
-        </p:txBody>
-      </p:sp>
-      <p:sp>
-        <p:nvSpPr>
-          <p:cNvPr id="4" name="Slide Number Placeholder 3"/>
-          <p:cNvSpPr>
-            <a:spLocks noGrp="1"/>
-          </p:cNvSpPr>
-          <p:nvPr>
-            <p:ph type="sldNum" sz="quarter" idx="5"/>
-          </p:nvPr>
-        </p:nvSpPr>
-        <p:spPr/>
-        <p:txBody>
-          <a:bodyPr/>
-          <a:lstStyle/>
-          <a:p>
-            <a:fld id="{C5571639-3197-4FC2-9950-173E0B3A8D54}" type="slidenum">
-              <a:rPr lang="en-US" smtClean="0"/>
-              <a:t>13</a:t>
-            </a:fld>
-            <a:endParaRPr lang="en-US"/>
-          </a:p>
-        </p:txBody>
-      </p:sp>
-    </p:spTree>
-    <p:extLst>
-      <p:ext uri="{BB962C8B-B14F-4D97-AF65-F5344CB8AC3E}">
-        <p14:creationId xmlns:p14="http://schemas.microsoft.com/office/powerpoint/2010/main" val="3414871386"/>
-      </p:ext>
-    </p:extLst>
-  </p:cSld>
-  <p:clrMapOvr>
-    <a:masterClrMapping/>
-  </p:clrMapOvr>
-</p:notes>
-</file>
-
-<file path=ppt/notesSlides/notesSlide2.xml><?xml version="1.0" encoding="utf-8"?>
-<p:notes xmlns:a="http://schemas.openxmlformats.org/drawingml/2006/main" xmlns:r="http://schemas.openxmlformats.org/officeDocument/2006/relationships" xmlns:p="http://schemas.openxmlformats.org/presentationml/2006/main">
-  <p:cSld>
-    <p:spTree>
-      <p:nvGrpSpPr>
         <p:cNvPr id="1" name="">
           <a:extLst>
             <a:ext uri="{FF2B5EF4-FFF2-40B4-BE49-F238E27FC236}">
@@ -690,7 +604,7 @@
           <a:p>
             <a:fld id="{C5571639-3197-4FC2-9950-173E0B3A8D54}" type="slidenum">
               <a:rPr lang="en-US" smtClean="0"/>
-              <a:t>14</a:t>
+              <a:t>8</a:t>
             </a:fld>
             <a:endParaRPr lang="en-US"/>
           </a:p>
@@ -699,7 +613,7 @@
     </p:spTree>
     <p:extLst>
       <p:ext uri="{BB962C8B-B14F-4D97-AF65-F5344CB8AC3E}">
-        <p14:creationId xmlns:p14="http://schemas.microsoft.com/office/powerpoint/2010/main" val="1352847105"/>
+        <p14:creationId xmlns:p14="http://schemas.microsoft.com/office/powerpoint/2010/main" val="1003595915"/>
       </p:ext>
     </p:extLst>
   </p:cSld>
@@ -856,7 +770,7 @@
           <a:p>
             <a:fld id="{1C1BBDF2-9A12-4067-84DF-8DD5947A1DA9}" type="datetimeFigureOut">
               <a:rPr lang="en-US" smtClean="0"/>
-              <a:t>12/18/2024</a:t>
+              <a:t>12/19/2024</a:t>
             </a:fld>
             <a:endParaRPr lang="en-US"/>
           </a:p>
@@ -1054,7 +968,7 @@
           <a:p>
             <a:fld id="{1C1BBDF2-9A12-4067-84DF-8DD5947A1DA9}" type="datetimeFigureOut">
               <a:rPr lang="en-US" smtClean="0"/>
-              <a:t>12/18/2024</a:t>
+              <a:t>12/19/2024</a:t>
             </a:fld>
             <a:endParaRPr lang="en-US"/>
           </a:p>
@@ -1262,7 +1176,7 @@
           <a:p>
             <a:fld id="{1C1BBDF2-9A12-4067-84DF-8DD5947A1DA9}" type="datetimeFigureOut">
               <a:rPr lang="en-US" smtClean="0"/>
-              <a:t>12/18/2024</a:t>
+              <a:t>12/19/2024</a:t>
             </a:fld>
             <a:endParaRPr lang="en-US"/>
           </a:p>
@@ -1460,7 +1374,7 @@
           <a:p>
             <a:fld id="{1C1BBDF2-9A12-4067-84DF-8DD5947A1DA9}" type="datetimeFigureOut">
               <a:rPr lang="en-US" smtClean="0"/>
-              <a:t>12/18/2024</a:t>
+              <a:t>12/19/2024</a:t>
             </a:fld>
             <a:endParaRPr lang="en-US"/>
           </a:p>
@@ -1735,7 +1649,7 @@
           <a:p>
             <a:fld id="{1C1BBDF2-9A12-4067-84DF-8DD5947A1DA9}" type="datetimeFigureOut">
               <a:rPr lang="en-US" smtClean="0"/>
-              <a:t>12/18/2024</a:t>
+              <a:t>12/19/2024</a:t>
             </a:fld>
             <a:endParaRPr lang="en-US"/>
           </a:p>
@@ -2000,7 +1914,7 @@
           <a:p>
             <a:fld id="{1C1BBDF2-9A12-4067-84DF-8DD5947A1DA9}" type="datetimeFigureOut">
               <a:rPr lang="en-US" smtClean="0"/>
-              <a:t>12/18/2024</a:t>
+              <a:t>12/19/2024</a:t>
             </a:fld>
             <a:endParaRPr lang="en-US"/>
           </a:p>
@@ -2412,7 +2326,7 @@
           <a:p>
             <a:fld id="{1C1BBDF2-9A12-4067-84DF-8DD5947A1DA9}" type="datetimeFigureOut">
               <a:rPr lang="en-US" smtClean="0"/>
-              <a:t>12/18/2024</a:t>
+              <a:t>12/19/2024</a:t>
             </a:fld>
             <a:endParaRPr lang="en-US"/>
           </a:p>
@@ -2553,7 +2467,7 @@
           <a:p>
             <a:fld id="{1C1BBDF2-9A12-4067-84DF-8DD5947A1DA9}" type="datetimeFigureOut">
               <a:rPr lang="en-US" smtClean="0"/>
-              <a:t>12/18/2024</a:t>
+              <a:t>12/19/2024</a:t>
             </a:fld>
             <a:endParaRPr lang="en-US"/>
           </a:p>
@@ -2666,7 +2580,7 @@
           <a:p>
             <a:fld id="{1C1BBDF2-9A12-4067-84DF-8DD5947A1DA9}" type="datetimeFigureOut">
               <a:rPr lang="en-US" smtClean="0"/>
-              <a:t>12/18/2024</a:t>
+              <a:t>12/19/2024</a:t>
             </a:fld>
             <a:endParaRPr lang="en-US"/>
           </a:p>
@@ -2977,7 +2891,7 @@
           <a:p>
             <a:fld id="{1C1BBDF2-9A12-4067-84DF-8DD5947A1DA9}" type="datetimeFigureOut">
               <a:rPr lang="en-US" smtClean="0"/>
-              <a:t>12/18/2024</a:t>
+              <a:t>12/19/2024</a:t>
             </a:fld>
             <a:endParaRPr lang="en-US"/>
           </a:p>
@@ -3265,7 +3179,7 @@
           <a:p>
             <a:fld id="{1C1BBDF2-9A12-4067-84DF-8DD5947A1DA9}" type="datetimeFigureOut">
               <a:rPr lang="en-US" smtClean="0"/>
-              <a:t>12/18/2024</a:t>
+              <a:t>12/19/2024</a:t>
             </a:fld>
             <a:endParaRPr lang="en-US"/>
           </a:p>
@@ -3506,7 +3420,7 @@
           <a:p>
             <a:fld id="{1C1BBDF2-9A12-4067-84DF-8DD5947A1DA9}" type="datetimeFigureOut">
               <a:rPr lang="en-US" smtClean="0"/>
-              <a:t>12/18/2024</a:t>
+              <a:t>12/19/2024</a:t>
             </a:fld>
             <a:endParaRPr lang="en-US"/>
           </a:p>
@@ -3909,14 +3823,112 @@
 <file path=ppt/slides/slide1.xml><?xml version="1.0" encoding="utf-8"?>
 <p:sld xmlns:a="http://schemas.openxmlformats.org/drawingml/2006/main" xmlns:r="http://schemas.openxmlformats.org/officeDocument/2006/relationships" xmlns:p="http://schemas.openxmlformats.org/presentationml/2006/main">
   <p:cSld>
-    <p:bg>
-      <p:bgPr>
-        <a:solidFill>
-          <a:schemeClr val="bg1"/>
-        </a:solidFill>
-        <a:effectLst/>
-      </p:bgPr>
-    </p:bg>
+    <p:spTree>
+      <p:nvGrpSpPr>
+        <p:cNvPr id="1" name=""/>
+        <p:cNvGrpSpPr/>
+        <p:nvPr/>
+      </p:nvGrpSpPr>
+      <p:grpSpPr>
+        <a:xfrm>
+          <a:off x="0" y="0"/>
+          <a:ext cx="0" cy="0"/>
+          <a:chOff x="0" y="0"/>
+          <a:chExt cx="0" cy="0"/>
+        </a:xfrm>
+      </p:grpSpPr>
+      <p:sp>
+        <p:nvSpPr>
+          <p:cNvPr id="2" name="TextBox 1">
+            <a:extLst>
+              <a:ext uri="{FF2B5EF4-FFF2-40B4-BE49-F238E27FC236}">
+                <a16:creationId xmlns:a16="http://schemas.microsoft.com/office/drawing/2014/main" id="{CE0E7D2C-222B-4D63-EF33-338455EB4B98}"/>
+              </a:ext>
+            </a:extLst>
+          </p:cNvPr>
+          <p:cNvSpPr txBox="1"/>
+          <p:nvPr/>
+        </p:nvSpPr>
+        <p:spPr>
+          <a:xfrm>
+            <a:off x="519776" y="1305341"/>
+            <a:ext cx="10525895" cy="3323987"/>
+          </a:xfrm>
+          <a:prstGeom prst="rect">
+            <a:avLst/>
+          </a:prstGeom>
+          <a:noFill/>
+        </p:spPr>
+        <p:txBody>
+          <a:bodyPr wrap="none" rtlCol="0">
+            <a:spAutoFit/>
+          </a:bodyPr>
+          <a:lstStyle/>
+          <a:p>
+            <a:r>
+              <a:rPr lang="en-US" sz="3000" dirty="0"/>
+              <a:t>GOAL: Establish</a:t>
+            </a:r>
+            <a:r>
+              <a:rPr lang="en-US" sz="3000" i="1" dirty="0"/>
+              <a:t> in silico </a:t>
+            </a:r>
+            <a:r>
+              <a:rPr lang="en-US" sz="3000" dirty="0"/>
+              <a:t>model of biparental care</a:t>
+            </a:r>
+          </a:p>
+          <a:p>
+            <a:endParaRPr lang="en-US" sz="3000" dirty="0"/>
+          </a:p>
+          <a:p>
+            <a:r>
+              <a:rPr lang="en-US" sz="3000" dirty="0"/>
+              <a:t>QUESTIONS FOR THE FIRST MS:</a:t>
+            </a:r>
+          </a:p>
+          <a:p>
+            <a:r>
+              <a:rPr lang="en-US" sz="3000" dirty="0"/>
+              <a:t>What makes an incubation strategy good?</a:t>
+            </a:r>
+          </a:p>
+          <a:p>
+            <a:r>
+              <a:rPr lang="en-US" sz="3000" dirty="0"/>
+              <a:t>Are strategies good individually, or in combination?</a:t>
+            </a:r>
+          </a:p>
+          <a:p>
+            <a:r>
+              <a:rPr lang="en-US" sz="3000" dirty="0"/>
+              <a:t>How sensitive is incubation success to environmental change?</a:t>
+            </a:r>
+          </a:p>
+          <a:p>
+            <a:r>
+              <a:rPr lang="en-US" sz="3000" dirty="0"/>
+              <a:t>How does environmental degradation cause incubation to fail?</a:t>
+            </a:r>
+          </a:p>
+        </p:txBody>
+      </p:sp>
+    </p:spTree>
+    <p:extLst>
+      <p:ext uri="{BB962C8B-B14F-4D97-AF65-F5344CB8AC3E}">
+        <p14:creationId xmlns:p14="http://schemas.microsoft.com/office/powerpoint/2010/main" val="2267379640"/>
+      </p:ext>
+    </p:extLst>
+  </p:cSld>
+  <p:clrMapOvr>
+    <a:masterClrMapping/>
+  </p:clrMapOvr>
+</p:sld>
+</file>
+
+<file path=ppt/slides/slide10.xml><?xml version="1.0" encoding="utf-8"?>
+<p:sld xmlns:a="http://schemas.openxmlformats.org/drawingml/2006/main" xmlns:r="http://schemas.openxmlformats.org/officeDocument/2006/relationships" xmlns:p="http://schemas.openxmlformats.org/presentationml/2006/main">
+  <p:cSld>
     <p:spTree>
       <p:nvGrpSpPr>
         <p:cNvPr id="1" name=""/>
@@ -3933,10 +3945,10 @@
       </p:grpSpPr>
       <p:pic>
         <p:nvPicPr>
-          <p:cNvPr id="3" name="Picture 2" descr="A graph of a graph&#10;&#10;Description automatically generated">
-            <a:extLst>
-              <a:ext uri="{FF2B5EF4-FFF2-40B4-BE49-F238E27FC236}">
-                <a16:creationId xmlns:a16="http://schemas.microsoft.com/office/drawing/2014/main" id="{1287A37D-BCDB-F59E-45EF-EA04DFE54C87}"/>
+          <p:cNvPr id="6" name="Picture 5" descr="A graph of a barcode&#10;&#10;Description automatically generated">
+            <a:extLst>
+              <a:ext uri="{FF2B5EF4-FFF2-40B4-BE49-F238E27FC236}">
+                <a16:creationId xmlns:a16="http://schemas.microsoft.com/office/drawing/2014/main" id="{83AC652C-946F-F111-4A94-3775A480604E}"/>
               </a:ext>
             </a:extLst>
           </p:cNvPr>
@@ -3959,8 +3971,8 @@
         </p:blipFill>
         <p:spPr>
           <a:xfrm>
-            <a:off x="643467" y="1247985"/>
-            <a:ext cx="10905066" cy="4362028"/>
+            <a:off x="1981191" y="2057397"/>
+            <a:ext cx="8229617" cy="2743206"/>
           </a:xfrm>
           <a:prstGeom prst="rect">
             <a:avLst/>
@@ -3970,7 +3982,7 @@
     </p:spTree>
     <p:extLst>
       <p:ext uri="{BB962C8B-B14F-4D97-AF65-F5344CB8AC3E}">
-        <p14:creationId xmlns:p14="http://schemas.microsoft.com/office/powerpoint/2010/main" val="376781030"/>
+        <p14:creationId xmlns:p14="http://schemas.microsoft.com/office/powerpoint/2010/main" val="95320886"/>
       </p:ext>
     </p:extLst>
   </p:cSld>
@@ -3980,7 +3992,163 @@
 </p:sld>
 </file>
 
-<file path=ppt/slides/slide10.xml><?xml version="1.0" encoding="utf-8"?>
+<file path=ppt/slides/slide11.xml><?xml version="1.0" encoding="utf-8"?>
+<p:sld xmlns:a="http://schemas.openxmlformats.org/drawingml/2006/main" xmlns:r="http://schemas.openxmlformats.org/officeDocument/2006/relationships" xmlns:p="http://schemas.openxmlformats.org/presentationml/2006/main">
+  <p:cSld>
+    <p:spTree>
+      <p:nvGrpSpPr>
+        <p:cNvPr id="1" name=""/>
+        <p:cNvGrpSpPr/>
+        <p:nvPr/>
+      </p:nvGrpSpPr>
+      <p:grpSpPr>
+        <a:xfrm>
+          <a:off x="0" y="0"/>
+          <a:ext cx="0" cy="0"/>
+          <a:chOff x="0" y="0"/>
+          <a:chExt cx="0" cy="0"/>
+        </a:xfrm>
+      </p:grpSpPr>
+      <p:pic>
+        <p:nvPicPr>
+          <p:cNvPr id="5" name="Picture 4" descr="A barcode and a barcode&#10;&#10;Description automatically generated">
+            <a:extLst>
+              <a:ext uri="{FF2B5EF4-FFF2-40B4-BE49-F238E27FC236}">
+                <a16:creationId xmlns:a16="http://schemas.microsoft.com/office/drawing/2014/main" id="{D2DC2F13-35B0-555C-B77C-7EDFEBCE88BA}"/>
+              </a:ext>
+            </a:extLst>
+          </p:cNvPr>
+          <p:cNvPicPr>
+            <a:picLocks noChangeAspect="1"/>
+          </p:cNvPicPr>
+          <p:nvPr/>
+        </p:nvPicPr>
+        <p:blipFill>
+          <a:blip r:embed="rId2">
+            <a:extLst>
+              <a:ext uri="{28A0092B-C50C-407E-A947-70E740481C1C}">
+                <a14:useLocalDpi xmlns:a14="http://schemas.microsoft.com/office/drawing/2010/main" val="0"/>
+              </a:ext>
+            </a:extLst>
+          </a:blip>
+          <a:stretch>
+            <a:fillRect/>
+          </a:stretch>
+        </p:blipFill>
+        <p:spPr>
+          <a:xfrm>
+            <a:off x="1981191" y="2057397"/>
+            <a:ext cx="8229617" cy="2743206"/>
+          </a:xfrm>
+          <a:prstGeom prst="rect">
+            <a:avLst/>
+          </a:prstGeom>
+        </p:spPr>
+      </p:pic>
+    </p:spTree>
+    <p:extLst>
+      <p:ext uri="{BB962C8B-B14F-4D97-AF65-F5344CB8AC3E}">
+        <p14:creationId xmlns:p14="http://schemas.microsoft.com/office/powerpoint/2010/main" val="941701025"/>
+      </p:ext>
+    </p:extLst>
+  </p:cSld>
+  <p:clrMapOvr>
+    <a:masterClrMapping/>
+  </p:clrMapOvr>
+</p:sld>
+</file>
+
+<file path=ppt/slides/slide12.xml><?xml version="1.0" encoding="utf-8"?>
+<p:sld xmlns:a="http://schemas.openxmlformats.org/drawingml/2006/main" xmlns:r="http://schemas.openxmlformats.org/officeDocument/2006/relationships" xmlns:p="http://schemas.openxmlformats.org/presentationml/2006/main">
+  <p:cSld>
+    <p:spTree>
+      <p:nvGrpSpPr>
+        <p:cNvPr id="1" name=""/>
+        <p:cNvGrpSpPr/>
+        <p:nvPr/>
+      </p:nvGrpSpPr>
+      <p:grpSpPr>
+        <a:xfrm>
+          <a:off x="0" y="0"/>
+          <a:ext cx="0" cy="0"/>
+          <a:chOff x="0" y="0"/>
+          <a:chExt cx="0" cy="0"/>
+        </a:xfrm>
+      </p:grpSpPr>
+    </p:spTree>
+    <p:extLst>
+      <p:ext uri="{BB962C8B-B14F-4D97-AF65-F5344CB8AC3E}">
+        <p14:creationId xmlns:p14="http://schemas.microsoft.com/office/powerpoint/2010/main" val="2526611211"/>
+      </p:ext>
+    </p:extLst>
+  </p:cSld>
+  <p:clrMapOvr>
+    <a:masterClrMapping/>
+  </p:clrMapOvr>
+</p:sld>
+</file>
+
+<file path=ppt/slides/slide13.xml><?xml version="1.0" encoding="utf-8"?>
+<p:sld xmlns:a="http://schemas.openxmlformats.org/drawingml/2006/main" xmlns:r="http://schemas.openxmlformats.org/officeDocument/2006/relationships" xmlns:p="http://schemas.openxmlformats.org/presentationml/2006/main">
+  <p:cSld>
+    <p:spTree>
+      <p:nvGrpSpPr>
+        <p:cNvPr id="1" name=""/>
+        <p:cNvGrpSpPr/>
+        <p:nvPr/>
+      </p:nvGrpSpPr>
+      <p:grpSpPr>
+        <a:xfrm>
+          <a:off x="0" y="0"/>
+          <a:ext cx="0" cy="0"/>
+          <a:chOff x="0" y="0"/>
+          <a:chExt cx="0" cy="0"/>
+        </a:xfrm>
+      </p:grpSpPr>
+      <p:pic>
+        <p:nvPicPr>
+          <p:cNvPr id="7" name="Picture 6">
+            <a:extLst>
+              <a:ext uri="{FF2B5EF4-FFF2-40B4-BE49-F238E27FC236}">
+                <a16:creationId xmlns:a16="http://schemas.microsoft.com/office/drawing/2014/main" id="{2B74E20D-F07E-48F3-203B-C0100AA9E5EC}"/>
+              </a:ext>
+            </a:extLst>
+          </p:cNvPr>
+          <p:cNvPicPr>
+            <a:picLocks noChangeAspect="1"/>
+          </p:cNvPicPr>
+          <p:nvPr/>
+        </p:nvPicPr>
+        <p:blipFill>
+          <a:blip r:embed="rId2"/>
+          <a:stretch>
+            <a:fillRect/>
+          </a:stretch>
+        </p:blipFill>
+        <p:spPr>
+          <a:xfrm>
+            <a:off x="1587268" y="1644558"/>
+            <a:ext cx="9017463" cy="3568883"/>
+          </a:xfrm>
+          <a:prstGeom prst="rect">
+            <a:avLst/>
+          </a:prstGeom>
+        </p:spPr>
+      </p:pic>
+    </p:spTree>
+    <p:extLst>
+      <p:ext uri="{BB962C8B-B14F-4D97-AF65-F5344CB8AC3E}">
+        <p14:creationId xmlns:p14="http://schemas.microsoft.com/office/powerpoint/2010/main" val="1999209054"/>
+      </p:ext>
+    </p:extLst>
+  </p:cSld>
+  <p:clrMapOvr>
+    <a:masterClrMapping/>
+  </p:clrMapOvr>
+</p:sld>
+</file>
+
+<file path=ppt/slides/slide14.xml><?xml version="1.0" encoding="utf-8"?>
 <p:sld xmlns:a="http://schemas.openxmlformats.org/drawingml/2006/main" xmlns:r="http://schemas.openxmlformats.org/officeDocument/2006/relationships" xmlns:p="http://schemas.openxmlformats.org/presentationml/2006/main">
   <p:cSld>
     <p:spTree>
@@ -3988,7 +4156,78 @@
         <p:cNvPr id="1" name="">
           <a:extLst>
             <a:ext uri="{FF2B5EF4-FFF2-40B4-BE49-F238E27FC236}">
-              <a16:creationId xmlns:a16="http://schemas.microsoft.com/office/drawing/2014/main" id="{1E23F0FD-BB6E-2757-43B8-3358A9243737}"/>
+              <a16:creationId xmlns:a16="http://schemas.microsoft.com/office/drawing/2014/main" id="{CFC8B5D5-DD06-A194-89B1-1A986D14DEE7}"/>
+            </a:ext>
+          </a:extLst>
+        </p:cNvPr>
+        <p:cNvGrpSpPr/>
+        <p:nvPr/>
+      </p:nvGrpSpPr>
+      <p:grpSpPr>
+        <a:xfrm>
+          <a:off x="0" y="0"/>
+          <a:ext cx="0" cy="0"/>
+          <a:chOff x="0" y="0"/>
+          <a:chExt cx="0" cy="0"/>
+        </a:xfrm>
+      </p:grpSpPr>
+      <p:sp>
+        <p:nvSpPr>
+          <p:cNvPr id="2" name="TextBox 1">
+            <a:extLst>
+              <a:ext uri="{FF2B5EF4-FFF2-40B4-BE49-F238E27FC236}">
+                <a16:creationId xmlns:a16="http://schemas.microsoft.com/office/drawing/2014/main" id="{668F768E-FE5A-4705-F7CC-AA223BDB1C3E}"/>
+              </a:ext>
+            </a:extLst>
+          </p:cNvPr>
+          <p:cNvSpPr txBox="1"/>
+          <p:nvPr/>
+        </p:nvSpPr>
+        <p:spPr>
+          <a:xfrm>
+            <a:off x="519776" y="1305341"/>
+            <a:ext cx="10525895" cy="553998"/>
+          </a:xfrm>
+          <a:prstGeom prst="rect">
+            <a:avLst/>
+          </a:prstGeom>
+          <a:noFill/>
+        </p:spPr>
+        <p:txBody>
+          <a:bodyPr wrap="none" rtlCol="0">
+            <a:spAutoFit/>
+          </a:bodyPr>
+          <a:lstStyle/>
+          <a:p>
+            <a:r>
+              <a:rPr lang="en-US" sz="3000" dirty="0"/>
+              <a:t>How sensitive is incubation success to environmental change?</a:t>
+            </a:r>
+          </a:p>
+        </p:txBody>
+      </p:sp>
+    </p:spTree>
+    <p:extLst>
+      <p:ext uri="{BB962C8B-B14F-4D97-AF65-F5344CB8AC3E}">
+        <p14:creationId xmlns:p14="http://schemas.microsoft.com/office/powerpoint/2010/main" val="2529960092"/>
+      </p:ext>
+    </p:extLst>
+  </p:cSld>
+  <p:clrMapOvr>
+    <a:masterClrMapping/>
+  </p:clrMapOvr>
+</p:sld>
+</file>
+
+<file path=ppt/slides/slide15.xml><?xml version="1.0" encoding="utf-8"?>
+<p:sld xmlns:a="http://schemas.openxmlformats.org/drawingml/2006/main" xmlns:r="http://schemas.openxmlformats.org/officeDocument/2006/relationships" xmlns:p="http://schemas.openxmlformats.org/presentationml/2006/main">
+  <p:cSld>
+    <p:spTree>
+      <p:nvGrpSpPr>
+        <p:cNvPr id="1" name="">
+          <a:extLst>
+            <a:ext uri="{FF2B5EF4-FFF2-40B4-BE49-F238E27FC236}">
+              <a16:creationId xmlns:a16="http://schemas.microsoft.com/office/drawing/2014/main" id="{2F9FBC07-C256-127D-BE09-E5B43CA7505F}"/>
             </a:ext>
           </a:extLst>
         </p:cNvPr>
@@ -4005,10 +4244,75 @@
       </p:grpSpPr>
       <p:pic>
         <p:nvPicPr>
-          <p:cNvPr id="3" name="Picture 2" descr="A graph of different types of growth&#10;&#10;Description automatically generated with medium confidence">
-            <a:extLst>
-              <a:ext uri="{FF2B5EF4-FFF2-40B4-BE49-F238E27FC236}">
-                <a16:creationId xmlns:a16="http://schemas.microsoft.com/office/drawing/2014/main" id="{7CE84B85-7CD6-FA50-69A0-8D8D807BA7F9}"/>
+          <p:cNvPr id="3" name="Picture 2" descr="A graph of a graph&#10;&#10;Description automatically generated with medium confidence">
+            <a:extLst>
+              <a:ext uri="{FF2B5EF4-FFF2-40B4-BE49-F238E27FC236}">
+                <a16:creationId xmlns:a16="http://schemas.microsoft.com/office/drawing/2014/main" id="{2C2BC088-C53E-37F9-C7B6-6B29637B0C73}"/>
+              </a:ext>
+            </a:extLst>
+          </p:cNvPr>
+          <p:cNvPicPr>
+            <a:picLocks noChangeAspect="1"/>
+          </p:cNvPicPr>
+          <p:nvPr/>
+        </p:nvPicPr>
+        <p:blipFill>
+          <a:blip r:embed="rId2">
+            <a:extLst>
+              <a:ext uri="{28A0092B-C50C-407E-A947-70E740481C1C}">
+                <a14:useLocalDpi xmlns:a14="http://schemas.microsoft.com/office/drawing/2010/main" val="0"/>
+              </a:ext>
+            </a:extLst>
+          </a:blip>
+          <a:srcRect r="15407"/>
+          <a:stretch/>
+        </p:blipFill>
+        <p:spPr>
+          <a:xfrm>
+            <a:off x="3352795" y="1142995"/>
+            <a:ext cx="4641136" cy="4572009"/>
+          </a:xfrm>
+          <a:prstGeom prst="rect">
+            <a:avLst/>
+          </a:prstGeom>
+        </p:spPr>
+      </p:pic>
+    </p:spTree>
+    <p:extLst>
+      <p:ext uri="{BB962C8B-B14F-4D97-AF65-F5344CB8AC3E}">
+        <p14:creationId xmlns:p14="http://schemas.microsoft.com/office/powerpoint/2010/main" val="3665313451"/>
+      </p:ext>
+    </p:extLst>
+  </p:cSld>
+  <p:clrMapOvr>
+    <a:masterClrMapping/>
+  </p:clrMapOvr>
+</p:sld>
+</file>
+
+<file path=ppt/slides/slide16.xml><?xml version="1.0" encoding="utf-8"?>
+<p:sld xmlns:a="http://schemas.openxmlformats.org/drawingml/2006/main" xmlns:r="http://schemas.openxmlformats.org/officeDocument/2006/relationships" xmlns:p="http://schemas.openxmlformats.org/presentationml/2006/main">
+  <p:cSld>
+    <p:spTree>
+      <p:nvGrpSpPr>
+        <p:cNvPr id="1" name=""/>
+        <p:cNvGrpSpPr/>
+        <p:nvPr/>
+      </p:nvGrpSpPr>
+      <p:grpSpPr>
+        <a:xfrm>
+          <a:off x="0" y="0"/>
+          <a:ext cx="0" cy="0"/>
+          <a:chOff x="0" y="0"/>
+          <a:chExt cx="0" cy="0"/>
+        </a:xfrm>
+      </p:grpSpPr>
+      <p:pic>
+        <p:nvPicPr>
+          <p:cNvPr id="5" name="Picture 4" descr="A graph of a graph&#10;&#10;Description automatically generated">
+            <a:extLst>
+              <a:ext uri="{FF2B5EF4-FFF2-40B4-BE49-F238E27FC236}">
+                <a16:creationId xmlns:a16="http://schemas.microsoft.com/office/drawing/2014/main" id="{16FD1ECE-310F-FE10-C0A1-4BC119D83A57}"/>
               </a:ext>
             </a:extLst>
           </p:cNvPr>
@@ -4042,7 +4346,7 @@
     </p:spTree>
     <p:extLst>
       <p:ext uri="{BB962C8B-B14F-4D97-AF65-F5344CB8AC3E}">
-        <p14:creationId xmlns:p14="http://schemas.microsoft.com/office/powerpoint/2010/main" val="1409805099"/>
+        <p14:creationId xmlns:p14="http://schemas.microsoft.com/office/powerpoint/2010/main" val="1753272464"/>
       </p:ext>
     </p:extLst>
   </p:cSld>
@@ -4052,7 +4356,78 @@
 </p:sld>
 </file>
 
-<file path=ppt/slides/slide11.xml><?xml version="1.0" encoding="utf-8"?>
+<file path=ppt/slides/slide17.xml><?xml version="1.0" encoding="utf-8"?>
+<p:sld xmlns:a="http://schemas.openxmlformats.org/drawingml/2006/main" xmlns:r="http://schemas.openxmlformats.org/officeDocument/2006/relationships" xmlns:p="http://schemas.openxmlformats.org/presentationml/2006/main">
+  <p:cSld>
+    <p:spTree>
+      <p:nvGrpSpPr>
+        <p:cNvPr id="1" name="">
+          <a:extLst>
+            <a:ext uri="{FF2B5EF4-FFF2-40B4-BE49-F238E27FC236}">
+              <a16:creationId xmlns:a16="http://schemas.microsoft.com/office/drawing/2014/main" id="{0E416564-B21D-C760-9ECB-EFDB13E825EA}"/>
+            </a:ext>
+          </a:extLst>
+        </p:cNvPr>
+        <p:cNvGrpSpPr/>
+        <p:nvPr/>
+      </p:nvGrpSpPr>
+      <p:grpSpPr>
+        <a:xfrm>
+          <a:off x="0" y="0"/>
+          <a:ext cx="0" cy="0"/>
+          <a:chOff x="0" y="0"/>
+          <a:chExt cx="0" cy="0"/>
+        </a:xfrm>
+      </p:grpSpPr>
+      <p:sp>
+        <p:nvSpPr>
+          <p:cNvPr id="2" name="TextBox 1">
+            <a:extLst>
+              <a:ext uri="{FF2B5EF4-FFF2-40B4-BE49-F238E27FC236}">
+                <a16:creationId xmlns:a16="http://schemas.microsoft.com/office/drawing/2014/main" id="{23940952-C148-FE6F-5FF2-54DD6817E93C}"/>
+              </a:ext>
+            </a:extLst>
+          </p:cNvPr>
+          <p:cNvSpPr txBox="1"/>
+          <p:nvPr/>
+        </p:nvSpPr>
+        <p:spPr>
+          <a:xfrm>
+            <a:off x="519776" y="1305341"/>
+            <a:ext cx="10711202" cy="553998"/>
+          </a:xfrm>
+          <a:prstGeom prst="rect">
+            <a:avLst/>
+          </a:prstGeom>
+          <a:noFill/>
+        </p:spPr>
+        <p:txBody>
+          <a:bodyPr wrap="none" rtlCol="0">
+            <a:spAutoFit/>
+          </a:bodyPr>
+          <a:lstStyle/>
+          <a:p>
+            <a:r>
+              <a:rPr lang="en-US" sz="3000" dirty="0"/>
+              <a:t>How does environmental degradation cause incubation to fail?</a:t>
+            </a:r>
+          </a:p>
+        </p:txBody>
+      </p:sp>
+    </p:spTree>
+    <p:extLst>
+      <p:ext uri="{BB962C8B-B14F-4D97-AF65-F5344CB8AC3E}">
+        <p14:creationId xmlns:p14="http://schemas.microsoft.com/office/powerpoint/2010/main" val="1794008847"/>
+      </p:ext>
+    </p:extLst>
+  </p:cSld>
+  <p:clrMapOvr>
+    <a:masterClrMapping/>
+  </p:clrMapOvr>
+</p:sld>
+</file>
+
+<file path=ppt/slides/slide18.xml><?xml version="1.0" encoding="utf-8"?>
 <p:sld xmlns:a="http://schemas.openxmlformats.org/drawingml/2006/main" xmlns:r="http://schemas.openxmlformats.org/officeDocument/2006/relationships" xmlns:p="http://schemas.openxmlformats.org/presentationml/2006/main">
   <p:cSld>
     <p:bg>
@@ -4126,7 +4501,7 @@
 </p:sld>
 </file>
 
-<file path=ppt/slides/slide12.xml><?xml version="1.0" encoding="utf-8"?>
+<file path=ppt/slides/slide19.xml><?xml version="1.0" encoding="utf-8"?>
 <p:sld xmlns:a="http://schemas.openxmlformats.org/drawingml/2006/main" xmlns:r="http://schemas.openxmlformats.org/officeDocument/2006/relationships" xmlns:p="http://schemas.openxmlformats.org/presentationml/2006/main">
   <p:cSld>
     <p:bg>
@@ -4235,7 +4610,158 @@
 </p:sld>
 </file>
 
-<file path=ppt/slides/slide13.xml><?xml version="1.0" encoding="utf-8"?>
+<file path=ppt/slides/slide2.xml><?xml version="1.0" encoding="utf-8"?>
+<p:sld xmlns:a="http://schemas.openxmlformats.org/drawingml/2006/main" xmlns:r="http://schemas.openxmlformats.org/officeDocument/2006/relationships" xmlns:p="http://schemas.openxmlformats.org/presentationml/2006/main">
+  <p:cSld>
+    <p:spTree>
+      <p:nvGrpSpPr>
+        <p:cNvPr id="1" name="">
+          <a:extLst>
+            <a:ext uri="{FF2B5EF4-FFF2-40B4-BE49-F238E27FC236}">
+              <a16:creationId xmlns:a16="http://schemas.microsoft.com/office/drawing/2014/main" id="{98619E02-534B-29D2-3A15-F8FCB964E421}"/>
+            </a:ext>
+          </a:extLst>
+        </p:cNvPr>
+        <p:cNvGrpSpPr/>
+        <p:nvPr/>
+      </p:nvGrpSpPr>
+      <p:grpSpPr>
+        <a:xfrm>
+          <a:off x="0" y="0"/>
+          <a:ext cx="0" cy="0"/>
+          <a:chOff x="0" y="0"/>
+          <a:chExt cx="0" cy="0"/>
+        </a:xfrm>
+      </p:grpSpPr>
+      <p:sp>
+        <p:nvSpPr>
+          <p:cNvPr id="2" name="TextBox 1">
+            <a:extLst>
+              <a:ext uri="{FF2B5EF4-FFF2-40B4-BE49-F238E27FC236}">
+                <a16:creationId xmlns:a16="http://schemas.microsoft.com/office/drawing/2014/main" id="{820E395E-98AF-7C2A-687C-4BFDFDC0161B}"/>
+              </a:ext>
+            </a:extLst>
+          </p:cNvPr>
+          <p:cNvSpPr txBox="1"/>
+          <p:nvPr/>
+        </p:nvSpPr>
+        <p:spPr>
+          <a:xfrm>
+            <a:off x="519776" y="1305341"/>
+            <a:ext cx="8334333" cy="553998"/>
+          </a:xfrm>
+          <a:prstGeom prst="rect">
+            <a:avLst/>
+          </a:prstGeom>
+          <a:noFill/>
+        </p:spPr>
+        <p:txBody>
+          <a:bodyPr wrap="none" rtlCol="0">
+            <a:spAutoFit/>
+          </a:bodyPr>
+          <a:lstStyle/>
+          <a:p>
+            <a:r>
+              <a:rPr lang="en-US" sz="3000" dirty="0"/>
+              <a:t>GOAL: Establish</a:t>
+            </a:r>
+            <a:r>
+              <a:rPr lang="en-US" sz="3000" i="1" dirty="0"/>
+              <a:t> in silico </a:t>
+            </a:r>
+            <a:r>
+              <a:rPr lang="en-US" sz="3000" dirty="0"/>
+              <a:t>model of biparental care</a:t>
+            </a:r>
+          </a:p>
+        </p:txBody>
+      </p:sp>
+    </p:spTree>
+    <p:extLst>
+      <p:ext uri="{BB962C8B-B14F-4D97-AF65-F5344CB8AC3E}">
+        <p14:creationId xmlns:p14="http://schemas.microsoft.com/office/powerpoint/2010/main" val="2388118141"/>
+      </p:ext>
+    </p:extLst>
+  </p:cSld>
+  <p:clrMapOvr>
+    <a:masterClrMapping/>
+  </p:clrMapOvr>
+</p:sld>
+</file>
+
+<file path=ppt/slides/slide20.xml><?xml version="1.0" encoding="utf-8"?>
+<p:sld xmlns:a="http://schemas.openxmlformats.org/drawingml/2006/main" xmlns:r="http://schemas.openxmlformats.org/officeDocument/2006/relationships" xmlns:p="http://schemas.openxmlformats.org/presentationml/2006/main">
+  <p:cSld>
+    <p:spTree>
+      <p:nvGrpSpPr>
+        <p:cNvPr id="1" name="">
+          <a:extLst>
+            <a:ext uri="{FF2B5EF4-FFF2-40B4-BE49-F238E27FC236}">
+              <a16:creationId xmlns:a16="http://schemas.microsoft.com/office/drawing/2014/main" id="{63F052C4-B740-3B75-4EE3-2F4EEA218213}"/>
+            </a:ext>
+          </a:extLst>
+        </p:cNvPr>
+        <p:cNvGrpSpPr/>
+        <p:nvPr/>
+      </p:nvGrpSpPr>
+      <p:grpSpPr>
+        <a:xfrm>
+          <a:off x="0" y="0"/>
+          <a:ext cx="0" cy="0"/>
+          <a:chOff x="0" y="0"/>
+          <a:chExt cx="0" cy="0"/>
+        </a:xfrm>
+      </p:grpSpPr>
+      <p:pic>
+        <p:nvPicPr>
+          <p:cNvPr id="3" name="Picture 2" descr="A graph of a graph&#10;&#10;Description automatically generated">
+            <a:extLst>
+              <a:ext uri="{FF2B5EF4-FFF2-40B4-BE49-F238E27FC236}">
+                <a16:creationId xmlns:a16="http://schemas.microsoft.com/office/drawing/2014/main" id="{21623C33-E24C-1596-4B88-8289AD96F518}"/>
+              </a:ext>
+            </a:extLst>
+          </p:cNvPr>
+          <p:cNvPicPr>
+            <a:picLocks noChangeAspect="1"/>
+          </p:cNvPicPr>
+          <p:nvPr/>
+        </p:nvPicPr>
+        <p:blipFill>
+          <a:blip r:embed="rId2">
+            <a:extLst>
+              <a:ext uri="{28A0092B-C50C-407E-A947-70E740481C1C}">
+                <a14:useLocalDpi xmlns:a14="http://schemas.microsoft.com/office/drawing/2010/main" val="0"/>
+              </a:ext>
+            </a:extLst>
+          </a:blip>
+          <a:stretch>
+            <a:fillRect/>
+          </a:stretch>
+        </p:blipFill>
+        <p:spPr>
+          <a:xfrm>
+            <a:off x="643467" y="1247985"/>
+            <a:ext cx="10905066" cy="4362028"/>
+          </a:xfrm>
+          <a:prstGeom prst="rect">
+            <a:avLst/>
+          </a:prstGeom>
+        </p:spPr>
+      </p:pic>
+    </p:spTree>
+    <p:extLst>
+      <p:ext uri="{BB962C8B-B14F-4D97-AF65-F5344CB8AC3E}">
+        <p14:creationId xmlns:p14="http://schemas.microsoft.com/office/powerpoint/2010/main" val="981264521"/>
+      </p:ext>
+    </p:extLst>
+  </p:cSld>
+  <p:clrMapOvr>
+    <a:masterClrMapping/>
+  </p:clrMapOvr>
+</p:sld>
+</file>
+
+<file path=ppt/slides/slide21.xml><?xml version="1.0" encoding="utf-8"?>
 <p:sld xmlns:a="http://schemas.openxmlformats.org/drawingml/2006/main" xmlns:r="http://schemas.openxmlformats.org/officeDocument/2006/relationships" xmlns:p="http://schemas.openxmlformats.org/presentationml/2006/main">
   <p:cSld>
     <p:bg>
@@ -4262,725 +4788,10 @@
       </p:grpSpPr>
       <p:pic>
         <p:nvPicPr>
-          <p:cNvPr id="3" name="Picture 2" descr="A graph of a graph showing the same graph&#10;&#10;Description automatically generated with medium confidence">
-            <a:extLst>
-              <a:ext uri="{FF2B5EF4-FFF2-40B4-BE49-F238E27FC236}">
-                <a16:creationId xmlns:a16="http://schemas.microsoft.com/office/drawing/2014/main" id="{B5DBE08C-1018-56B2-FF90-44461BC74CA4}"/>
-              </a:ext>
-            </a:extLst>
-          </p:cNvPr>
-          <p:cNvPicPr>
-            <a:picLocks noChangeAspect="1"/>
-          </p:cNvPicPr>
-          <p:nvPr/>
-        </p:nvPicPr>
-        <p:blipFill>
-          <a:blip r:embed="rId3">
-            <a:extLst>
-              <a:ext uri="{28A0092B-C50C-407E-A947-70E740481C1C}">
-                <a14:useLocalDpi xmlns:a14="http://schemas.microsoft.com/office/drawing/2010/main" val="0"/>
-              </a:ext>
-            </a:extLst>
-          </a:blip>
-          <a:srcRect r="48007" b="11791"/>
-          <a:stretch/>
-        </p:blipFill>
-        <p:spPr>
-          <a:xfrm>
-            <a:off x="1523991" y="1600197"/>
-            <a:ext cx="4754262" cy="3226328"/>
-          </a:xfrm>
-          <a:prstGeom prst="rect">
-            <a:avLst/>
-          </a:prstGeom>
-        </p:spPr>
-      </p:pic>
-      <p:pic>
-        <p:nvPicPr>
-          <p:cNvPr id="4" name="Picture 3" descr="A graph of a graph showing the same graph&#10;&#10;Description automatically generated with medium confidence">
-            <a:extLst>
-              <a:ext uri="{FF2B5EF4-FFF2-40B4-BE49-F238E27FC236}">
-                <a16:creationId xmlns:a16="http://schemas.microsoft.com/office/drawing/2014/main" id="{AB89F178-5343-988B-EA92-908E94485048}"/>
-              </a:ext>
-            </a:extLst>
-          </p:cNvPr>
-          <p:cNvPicPr>
-            <a:picLocks noChangeAspect="1"/>
-          </p:cNvPicPr>
-          <p:nvPr/>
-        </p:nvPicPr>
-        <p:blipFill>
-          <a:blip r:embed="rId3">
-            <a:extLst>
-              <a:ext uri="{28A0092B-C50C-407E-A947-70E740481C1C}">
-                <a14:useLocalDpi xmlns:a14="http://schemas.microsoft.com/office/drawing/2010/main" val="0"/>
-              </a:ext>
-            </a:extLst>
-          </a:blip>
-          <a:srcRect l="39811" t="88209" r="28746" b="1525"/>
-          <a:stretch/>
-        </p:blipFill>
-        <p:spPr>
-          <a:xfrm>
-            <a:off x="3091991" y="4882303"/>
-            <a:ext cx="2875175" cy="375500"/>
-          </a:xfrm>
-          <a:prstGeom prst="rect">
-            <a:avLst/>
-          </a:prstGeom>
-        </p:spPr>
-      </p:pic>
-    </p:spTree>
-    <p:extLst>
-      <p:ext uri="{BB962C8B-B14F-4D97-AF65-F5344CB8AC3E}">
-        <p14:creationId xmlns:p14="http://schemas.microsoft.com/office/powerpoint/2010/main" val="2802535663"/>
-      </p:ext>
-    </p:extLst>
-  </p:cSld>
-  <p:clrMapOvr>
-    <a:masterClrMapping/>
-  </p:clrMapOvr>
-</p:sld>
-</file>
-
-<file path=ppt/slides/slide14.xml><?xml version="1.0" encoding="utf-8"?>
-<p:sld xmlns:a="http://schemas.openxmlformats.org/drawingml/2006/main" xmlns:r="http://schemas.openxmlformats.org/officeDocument/2006/relationships" xmlns:p="http://schemas.openxmlformats.org/presentationml/2006/main">
-  <p:cSld>
-    <p:spTree>
-      <p:nvGrpSpPr>
-        <p:cNvPr id="1" name="">
-          <a:extLst>
-            <a:ext uri="{FF2B5EF4-FFF2-40B4-BE49-F238E27FC236}">
-              <a16:creationId xmlns:a16="http://schemas.microsoft.com/office/drawing/2014/main" id="{7869A708-7F53-73DD-C137-CCC30679A99D}"/>
-            </a:ext>
-          </a:extLst>
-        </p:cNvPr>
-        <p:cNvGrpSpPr/>
-        <p:nvPr/>
-      </p:nvGrpSpPr>
-      <p:grpSpPr>
-        <a:xfrm>
-          <a:off x="0" y="0"/>
-          <a:ext cx="0" cy="0"/>
-          <a:chOff x="0" y="0"/>
-          <a:chExt cx="0" cy="0"/>
-        </a:xfrm>
-      </p:grpSpPr>
-      <p:pic>
-        <p:nvPicPr>
-          <p:cNvPr id="3" name="Picture 2" descr="A graph of a graph showing the same graph&#10;&#10;Description automatically generated with medium confidence">
-            <a:extLst>
-              <a:ext uri="{FF2B5EF4-FFF2-40B4-BE49-F238E27FC236}">
-                <a16:creationId xmlns:a16="http://schemas.microsoft.com/office/drawing/2014/main" id="{B6820AEC-7A42-FB77-77BC-757E56AA1675}"/>
-              </a:ext>
-            </a:extLst>
-          </p:cNvPr>
-          <p:cNvPicPr>
-            <a:picLocks noChangeAspect="1"/>
-          </p:cNvPicPr>
-          <p:nvPr/>
-        </p:nvPicPr>
-        <p:blipFill>
-          <a:blip r:embed="rId3">
-            <a:extLst>
-              <a:ext uri="{28A0092B-C50C-407E-A947-70E740481C1C}">
-                <a14:useLocalDpi xmlns:a14="http://schemas.microsoft.com/office/drawing/2010/main" val="0"/>
-              </a:ext>
-            </a:extLst>
-          </a:blip>
-          <a:stretch>
-            <a:fillRect/>
-          </a:stretch>
-        </p:blipFill>
-        <p:spPr>
-          <a:xfrm>
-            <a:off x="1523990" y="1600196"/>
-            <a:ext cx="9144019" cy="3657607"/>
-          </a:xfrm>
-          <a:prstGeom prst="rect">
-            <a:avLst/>
-          </a:prstGeom>
-        </p:spPr>
-      </p:pic>
-    </p:spTree>
-    <p:extLst>
-      <p:ext uri="{BB962C8B-B14F-4D97-AF65-F5344CB8AC3E}">
-        <p14:creationId xmlns:p14="http://schemas.microsoft.com/office/powerpoint/2010/main" val="3773401382"/>
-      </p:ext>
-    </p:extLst>
-  </p:cSld>
-  <p:clrMapOvr>
-    <a:masterClrMapping/>
-  </p:clrMapOvr>
-</p:sld>
-</file>
-
-<file path=ppt/slides/slide15.xml><?xml version="1.0" encoding="utf-8"?>
-<p:sld xmlns:a="http://schemas.openxmlformats.org/drawingml/2006/main" xmlns:r="http://schemas.openxmlformats.org/officeDocument/2006/relationships" xmlns:p="http://schemas.openxmlformats.org/presentationml/2006/main">
-  <p:cSld>
-    <p:spTree>
-      <p:nvGrpSpPr>
-        <p:cNvPr id="1" name=""/>
-        <p:cNvGrpSpPr/>
-        <p:nvPr/>
-      </p:nvGrpSpPr>
-      <p:grpSpPr>
-        <a:xfrm>
-          <a:off x="0" y="0"/>
-          <a:ext cx="0" cy="0"/>
-          <a:chOff x="0" y="0"/>
-          <a:chExt cx="0" cy="0"/>
-        </a:xfrm>
-      </p:grpSpPr>
-      <p:pic>
-        <p:nvPicPr>
-          <p:cNvPr id="3" name="Picture 2" descr="A graph of success in regular environment&#10;&#10;Description automatically generated">
-            <a:extLst>
-              <a:ext uri="{FF2B5EF4-FFF2-40B4-BE49-F238E27FC236}">
-                <a16:creationId xmlns:a16="http://schemas.microsoft.com/office/drawing/2014/main" id="{F0FA5A7B-7CB2-55CE-2E7F-15969AC9184A}"/>
-              </a:ext>
-            </a:extLst>
-          </p:cNvPr>
-          <p:cNvPicPr>
-            <a:picLocks noChangeAspect="1"/>
-          </p:cNvPicPr>
-          <p:nvPr/>
-        </p:nvPicPr>
-        <p:blipFill>
-          <a:blip r:embed="rId2">
-            <a:extLst>
-              <a:ext uri="{28A0092B-C50C-407E-A947-70E740481C1C}">
-                <a14:useLocalDpi xmlns:a14="http://schemas.microsoft.com/office/drawing/2010/main" val="0"/>
-              </a:ext>
-            </a:extLst>
-          </a:blip>
-          <a:stretch>
-            <a:fillRect/>
-          </a:stretch>
-        </p:blipFill>
-        <p:spPr>
-          <a:xfrm>
-            <a:off x="2895593" y="1600196"/>
-            <a:ext cx="6400813" cy="3657607"/>
-          </a:xfrm>
-          <a:prstGeom prst="rect">
-            <a:avLst/>
-          </a:prstGeom>
-        </p:spPr>
-      </p:pic>
-    </p:spTree>
-    <p:extLst>
-      <p:ext uri="{BB962C8B-B14F-4D97-AF65-F5344CB8AC3E}">
-        <p14:creationId xmlns:p14="http://schemas.microsoft.com/office/powerpoint/2010/main" val="317393151"/>
-      </p:ext>
-    </p:extLst>
-  </p:cSld>
-  <p:clrMapOvr>
-    <a:masterClrMapping/>
-  </p:clrMapOvr>
-</p:sld>
-</file>
-
-<file path=ppt/slides/slide16.xml><?xml version="1.0" encoding="utf-8"?>
-<p:sld xmlns:a="http://schemas.openxmlformats.org/drawingml/2006/main" xmlns:r="http://schemas.openxmlformats.org/officeDocument/2006/relationships" xmlns:p="http://schemas.openxmlformats.org/presentationml/2006/main">
-  <p:cSld>
-    <p:spTree>
-      <p:nvGrpSpPr>
-        <p:cNvPr id="1" name=""/>
-        <p:cNvGrpSpPr/>
-        <p:nvPr/>
-      </p:nvGrpSpPr>
-      <p:grpSpPr>
-        <a:xfrm>
-          <a:off x="0" y="0"/>
-          <a:ext cx="0" cy="0"/>
-          <a:chOff x="0" y="0"/>
-          <a:chExt cx="0" cy="0"/>
-        </a:xfrm>
-      </p:grpSpPr>
-      <p:pic>
-        <p:nvPicPr>
-          <p:cNvPr id="5" name="Picture 4" descr="A graph of growth and progress&#10;&#10;Description automatically generated with medium confidence">
-            <a:extLst>
-              <a:ext uri="{FF2B5EF4-FFF2-40B4-BE49-F238E27FC236}">
-                <a16:creationId xmlns:a16="http://schemas.microsoft.com/office/drawing/2014/main" id="{DBA6D59E-51F9-E5B9-D2F1-396A325B42CB}"/>
-              </a:ext>
-            </a:extLst>
-          </p:cNvPr>
-          <p:cNvPicPr>
-            <a:picLocks noChangeAspect="1"/>
-          </p:cNvPicPr>
-          <p:nvPr/>
-        </p:nvPicPr>
-        <p:blipFill>
-          <a:blip r:embed="rId2">
-            <a:extLst>
-              <a:ext uri="{28A0092B-C50C-407E-A947-70E740481C1C}">
-                <a14:useLocalDpi xmlns:a14="http://schemas.microsoft.com/office/drawing/2010/main" val="0"/>
-              </a:ext>
-            </a:extLst>
-          </a:blip>
-          <a:stretch>
-            <a:fillRect/>
-          </a:stretch>
-        </p:blipFill>
-        <p:spPr>
-          <a:xfrm>
-            <a:off x="2895593" y="1600196"/>
-            <a:ext cx="6400813" cy="3657607"/>
-          </a:xfrm>
-          <a:prstGeom prst="rect">
-            <a:avLst/>
-          </a:prstGeom>
-        </p:spPr>
-      </p:pic>
-    </p:spTree>
-    <p:extLst>
-      <p:ext uri="{BB962C8B-B14F-4D97-AF65-F5344CB8AC3E}">
-        <p14:creationId xmlns:p14="http://schemas.microsoft.com/office/powerpoint/2010/main" val="1207003560"/>
-      </p:ext>
-    </p:extLst>
-  </p:cSld>
-  <p:clrMapOvr>
-    <a:masterClrMapping/>
-  </p:clrMapOvr>
-</p:sld>
-</file>
-
-<file path=ppt/slides/slide17.xml><?xml version="1.0" encoding="utf-8"?>
-<p:sld xmlns:a="http://schemas.openxmlformats.org/drawingml/2006/main" xmlns:r="http://schemas.openxmlformats.org/officeDocument/2006/relationships" xmlns:p="http://schemas.openxmlformats.org/presentationml/2006/main">
-  <p:cSld>
-    <p:spTree>
-      <p:nvGrpSpPr>
-        <p:cNvPr id="1" name=""/>
-        <p:cNvGrpSpPr/>
-        <p:nvPr/>
-      </p:nvGrpSpPr>
-      <p:grpSpPr>
-        <a:xfrm>
-          <a:off x="0" y="0"/>
-          <a:ext cx="0" cy="0"/>
-          <a:chOff x="0" y="0"/>
-          <a:chExt cx="0" cy="0"/>
-        </a:xfrm>
-      </p:grpSpPr>
-      <p:pic>
-        <p:nvPicPr>
-          <p:cNvPr id="9" name="Picture 8" descr="A line of smoke from a plane&#10;&#10;Description automatically generated with medium confidence">
-            <a:extLst>
-              <a:ext uri="{FF2B5EF4-FFF2-40B4-BE49-F238E27FC236}">
-                <a16:creationId xmlns:a16="http://schemas.microsoft.com/office/drawing/2014/main" id="{22DC32AC-8C0D-0223-4F8F-AA6A05A165EA}"/>
-              </a:ext>
-            </a:extLst>
-          </p:cNvPr>
-          <p:cNvPicPr>
-            <a:picLocks noChangeAspect="1"/>
-          </p:cNvPicPr>
-          <p:nvPr/>
-        </p:nvPicPr>
-        <p:blipFill>
-          <a:blip r:embed="rId2">
-            <a:extLst>
-              <a:ext uri="{28A0092B-C50C-407E-A947-70E740481C1C}">
-                <a14:useLocalDpi xmlns:a14="http://schemas.microsoft.com/office/drawing/2010/main" val="0"/>
-              </a:ext>
-            </a:extLst>
-          </a:blip>
-          <a:stretch>
-            <a:fillRect/>
-          </a:stretch>
-        </p:blipFill>
-        <p:spPr>
-          <a:xfrm>
-            <a:off x="2895593" y="1600196"/>
-            <a:ext cx="6400813" cy="3657607"/>
-          </a:xfrm>
-          <a:prstGeom prst="rect">
-            <a:avLst/>
-          </a:prstGeom>
-        </p:spPr>
-      </p:pic>
-    </p:spTree>
-    <p:extLst>
-      <p:ext uri="{BB962C8B-B14F-4D97-AF65-F5344CB8AC3E}">
-        <p14:creationId xmlns:p14="http://schemas.microsoft.com/office/powerpoint/2010/main" val="3352682201"/>
-      </p:ext>
-    </p:extLst>
-  </p:cSld>
-  <p:clrMapOvr>
-    <a:masterClrMapping/>
-  </p:clrMapOvr>
-</p:sld>
-</file>
-
-<file path=ppt/slides/slide18.xml><?xml version="1.0" encoding="utf-8"?>
-<p:sld xmlns:a="http://schemas.openxmlformats.org/drawingml/2006/main" xmlns:r="http://schemas.openxmlformats.org/officeDocument/2006/relationships" xmlns:p="http://schemas.openxmlformats.org/presentationml/2006/main">
-  <p:cSld>
-    <p:spTree>
-      <p:nvGrpSpPr>
-        <p:cNvPr id="1" name=""/>
-        <p:cNvGrpSpPr/>
-        <p:nvPr/>
-      </p:nvGrpSpPr>
-      <p:grpSpPr>
-        <a:xfrm>
-          <a:off x="0" y="0"/>
-          <a:ext cx="0" cy="0"/>
-          <a:chOff x="0" y="0"/>
-          <a:chExt cx="0" cy="0"/>
-        </a:xfrm>
-      </p:grpSpPr>
-      <p:pic>
-        <p:nvPicPr>
-          <p:cNvPr id="17" name="Picture 16" descr="A black line in the air&#10;&#10;Description automatically generated">
-            <a:extLst>
-              <a:ext uri="{FF2B5EF4-FFF2-40B4-BE49-F238E27FC236}">
-                <a16:creationId xmlns:a16="http://schemas.microsoft.com/office/drawing/2014/main" id="{CDD4C940-C36D-84DB-7039-F758EE51F696}"/>
-              </a:ext>
-            </a:extLst>
-          </p:cNvPr>
-          <p:cNvPicPr>
-            <a:picLocks noChangeAspect="1"/>
-          </p:cNvPicPr>
-          <p:nvPr/>
-        </p:nvPicPr>
-        <p:blipFill>
-          <a:blip r:embed="rId2">
-            <a:extLst>
-              <a:ext uri="{28A0092B-C50C-407E-A947-70E740481C1C}">
-                <a14:useLocalDpi xmlns:a14="http://schemas.microsoft.com/office/drawing/2010/main" val="0"/>
-              </a:ext>
-            </a:extLst>
-          </a:blip>
-          <a:stretch>
-            <a:fillRect/>
-          </a:stretch>
-        </p:blipFill>
-        <p:spPr>
-          <a:xfrm>
-            <a:off x="2895593" y="1600196"/>
-            <a:ext cx="6400813" cy="3657607"/>
-          </a:xfrm>
-          <a:prstGeom prst="rect">
-            <a:avLst/>
-          </a:prstGeom>
-        </p:spPr>
-      </p:pic>
-    </p:spTree>
-    <p:extLst>
-      <p:ext uri="{BB962C8B-B14F-4D97-AF65-F5344CB8AC3E}">
-        <p14:creationId xmlns:p14="http://schemas.microsoft.com/office/powerpoint/2010/main" val="2871201672"/>
-      </p:ext>
-    </p:extLst>
-  </p:cSld>
-  <p:clrMapOvr>
-    <a:masterClrMapping/>
-  </p:clrMapOvr>
-</p:sld>
-</file>
-
-<file path=ppt/slides/slide19.xml><?xml version="1.0" encoding="utf-8"?>
-<p:sld xmlns:a="http://schemas.openxmlformats.org/drawingml/2006/main" xmlns:r="http://schemas.openxmlformats.org/officeDocument/2006/relationships" xmlns:p="http://schemas.openxmlformats.org/presentationml/2006/main">
-  <p:cSld>
-    <p:spTree>
-      <p:nvGrpSpPr>
-        <p:cNvPr id="1" name=""/>
-        <p:cNvGrpSpPr/>
-        <p:nvPr/>
-      </p:nvGrpSpPr>
-      <p:grpSpPr>
-        <a:xfrm>
-          <a:off x="0" y="0"/>
-          <a:ext cx="0" cy="0"/>
-          <a:chOff x="0" y="0"/>
-          <a:chExt cx="0" cy="0"/>
-        </a:xfrm>
-      </p:grpSpPr>
-      <p:pic>
-        <p:nvPicPr>
-          <p:cNvPr id="5" name="Picture 4" descr="A diagram of a graph&#10;&#10;Description automatically generated with medium confidence">
-            <a:extLst>
-              <a:ext uri="{FF2B5EF4-FFF2-40B4-BE49-F238E27FC236}">
-                <a16:creationId xmlns:a16="http://schemas.microsoft.com/office/drawing/2014/main" id="{DA6B11EF-4CCD-8A99-2A59-D554F75488AA}"/>
-              </a:ext>
-            </a:extLst>
-          </p:cNvPr>
-          <p:cNvPicPr>
-            <a:picLocks noChangeAspect="1"/>
-          </p:cNvPicPr>
-          <p:nvPr/>
-        </p:nvPicPr>
-        <p:blipFill>
-          <a:blip r:embed="rId2">
-            <a:extLst>
-              <a:ext uri="{28A0092B-C50C-407E-A947-70E740481C1C}">
-                <a14:useLocalDpi xmlns:a14="http://schemas.microsoft.com/office/drawing/2010/main" val="0"/>
-              </a:ext>
-            </a:extLst>
-          </a:blip>
-          <a:stretch>
-            <a:fillRect/>
-          </a:stretch>
-        </p:blipFill>
-        <p:spPr>
-          <a:xfrm>
-            <a:off x="2895593" y="1600196"/>
-            <a:ext cx="6400813" cy="3657607"/>
-          </a:xfrm>
-          <a:prstGeom prst="rect">
-            <a:avLst/>
-          </a:prstGeom>
-        </p:spPr>
-      </p:pic>
-    </p:spTree>
-    <p:extLst>
-      <p:ext uri="{BB962C8B-B14F-4D97-AF65-F5344CB8AC3E}">
-        <p14:creationId xmlns:p14="http://schemas.microsoft.com/office/powerpoint/2010/main" val="2604940391"/>
-      </p:ext>
-    </p:extLst>
-  </p:cSld>
-  <p:clrMapOvr>
-    <a:masterClrMapping/>
-  </p:clrMapOvr>
-</p:sld>
-</file>
-
-<file path=ppt/slides/slide2.xml><?xml version="1.0" encoding="utf-8"?>
-<p:sld xmlns:a="http://schemas.openxmlformats.org/drawingml/2006/main" xmlns:r="http://schemas.openxmlformats.org/officeDocument/2006/relationships" xmlns:p="http://schemas.openxmlformats.org/presentationml/2006/main">
-  <p:cSld>
-    <p:spTree>
-      <p:nvGrpSpPr>
-        <p:cNvPr id="1" name="">
-          <a:extLst>
-            <a:ext uri="{FF2B5EF4-FFF2-40B4-BE49-F238E27FC236}">
-              <a16:creationId xmlns:a16="http://schemas.microsoft.com/office/drawing/2014/main" id="{EFA75E66-ACB4-D5BA-3EDD-3409911E2F6F}"/>
-            </a:ext>
-          </a:extLst>
-        </p:cNvPr>
-        <p:cNvGrpSpPr/>
-        <p:nvPr/>
-      </p:nvGrpSpPr>
-      <p:grpSpPr>
-        <a:xfrm>
-          <a:off x="0" y="0"/>
-          <a:ext cx="0" cy="0"/>
-          <a:chOff x="0" y="0"/>
-          <a:chExt cx="0" cy="0"/>
-        </a:xfrm>
-      </p:grpSpPr>
-      <p:pic>
-        <p:nvPicPr>
-          <p:cNvPr id="3" name="Picture 2" descr="A screenshot of a computer&#10;&#10;Description automatically generated">
-            <a:extLst>
-              <a:ext uri="{FF2B5EF4-FFF2-40B4-BE49-F238E27FC236}">
-                <a16:creationId xmlns:a16="http://schemas.microsoft.com/office/drawing/2014/main" id="{30E2EDD4-1727-A7FC-828A-B7B0ED45D93A}"/>
-              </a:ext>
-            </a:extLst>
-          </p:cNvPr>
-          <p:cNvPicPr>
-            <a:picLocks noChangeAspect="1"/>
-          </p:cNvPicPr>
-          <p:nvPr/>
-        </p:nvPicPr>
-        <p:blipFill>
-          <a:blip r:embed="rId2">
-            <a:extLst>
-              <a:ext uri="{28A0092B-C50C-407E-A947-70E740481C1C}">
-                <a14:useLocalDpi xmlns:a14="http://schemas.microsoft.com/office/drawing/2010/main" val="0"/>
-              </a:ext>
-            </a:extLst>
-          </a:blip>
-          <a:srcRect r="66568"/>
-          <a:stretch/>
-        </p:blipFill>
-        <p:spPr>
-          <a:xfrm>
-            <a:off x="643467" y="1002622"/>
-            <a:ext cx="3645729" cy="4852755"/>
-          </a:xfrm>
-          <a:prstGeom prst="rect">
-            <a:avLst/>
-          </a:prstGeom>
-        </p:spPr>
-      </p:pic>
-      <p:pic>
-        <p:nvPicPr>
-          <p:cNvPr id="2" name="Picture 1" descr="A screenshot of a computer&#10;&#10;Description automatically generated">
-            <a:extLst>
-              <a:ext uri="{FF2B5EF4-FFF2-40B4-BE49-F238E27FC236}">
-                <a16:creationId xmlns:a16="http://schemas.microsoft.com/office/drawing/2014/main" id="{396D5702-570A-5CA5-0149-D45FFDA54D83}"/>
-              </a:ext>
-            </a:extLst>
-          </p:cNvPr>
-          <p:cNvPicPr>
-            <a:picLocks noChangeAspect="1"/>
-          </p:cNvPicPr>
-          <p:nvPr/>
-        </p:nvPicPr>
-        <p:blipFill>
-          <a:blip r:embed="rId2">
-            <a:extLst>
-              <a:ext uri="{28A0092B-C50C-407E-A947-70E740481C1C}">
-                <a14:useLocalDpi xmlns:a14="http://schemas.microsoft.com/office/drawing/2010/main" val="0"/>
-              </a:ext>
-            </a:extLst>
-          </a:blip>
-          <a:srcRect l="88410"/>
-          <a:stretch/>
-        </p:blipFill>
-        <p:spPr>
-          <a:xfrm>
-            <a:off x="4411744" y="1002622"/>
-            <a:ext cx="1263890" cy="4852755"/>
-          </a:xfrm>
-          <a:prstGeom prst="rect">
-            <a:avLst/>
-          </a:prstGeom>
-        </p:spPr>
-      </p:pic>
-      <p:pic>
-        <p:nvPicPr>
-          <p:cNvPr id="4" name="Picture 3" descr="A screenshot of a computer&#10;&#10;Description automatically generated">
-            <a:extLst>
-              <a:ext uri="{FF2B5EF4-FFF2-40B4-BE49-F238E27FC236}">
-                <a16:creationId xmlns:a16="http://schemas.microsoft.com/office/drawing/2014/main" id="{9C09AFF3-5769-47AA-73F9-5E415F6CB88E}"/>
-              </a:ext>
-            </a:extLst>
-          </p:cNvPr>
-          <p:cNvPicPr>
-            <a:picLocks noChangeAspect="1"/>
-          </p:cNvPicPr>
-          <p:nvPr/>
-        </p:nvPicPr>
-        <p:blipFill>
-          <a:blip r:embed="rId2">
-            <a:extLst>
-              <a:ext uri="{28A0092B-C50C-407E-A947-70E740481C1C}">
-                <a14:useLocalDpi xmlns:a14="http://schemas.microsoft.com/office/drawing/2010/main" val="0"/>
-              </a:ext>
-            </a:extLst>
-          </a:blip>
-          <a:srcRect l="42150" t="93530" r="47541"/>
-          <a:stretch/>
-        </p:blipFill>
-        <p:spPr>
-          <a:xfrm>
-            <a:off x="2215299" y="5541390"/>
-            <a:ext cx="1124236" cy="313987"/>
-          </a:xfrm>
-          <a:prstGeom prst="rect">
-            <a:avLst/>
-          </a:prstGeom>
-        </p:spPr>
-      </p:pic>
-    </p:spTree>
-    <p:extLst>
-      <p:ext uri="{BB962C8B-B14F-4D97-AF65-F5344CB8AC3E}">
-        <p14:creationId xmlns:p14="http://schemas.microsoft.com/office/powerpoint/2010/main" val="2923422350"/>
-      </p:ext>
-    </p:extLst>
-  </p:cSld>
-  <p:clrMapOvr>
-    <a:masterClrMapping/>
-  </p:clrMapOvr>
-</p:sld>
-</file>
-
-<file path=ppt/slides/slide20.xml><?xml version="1.0" encoding="utf-8"?>
-<p:sld xmlns:a="http://schemas.openxmlformats.org/drawingml/2006/main" xmlns:r="http://schemas.openxmlformats.org/officeDocument/2006/relationships" xmlns:p="http://schemas.openxmlformats.org/presentationml/2006/main">
-  <p:cSld>
-    <p:spTree>
-      <p:nvGrpSpPr>
-        <p:cNvPr id="1" name=""/>
-        <p:cNvGrpSpPr/>
-        <p:nvPr/>
-      </p:nvGrpSpPr>
-      <p:grpSpPr>
-        <a:xfrm>
-          <a:off x="0" y="0"/>
-          <a:ext cx="0" cy="0"/>
-          <a:chOff x="0" y="0"/>
-          <a:chExt cx="0" cy="0"/>
-        </a:xfrm>
-      </p:grpSpPr>
-      <p:pic>
-        <p:nvPicPr>
-          <p:cNvPr id="5" name="Picture 4" descr="A graph with dots and lines&#10;&#10;Description automatically generated">
-            <a:extLst>
-              <a:ext uri="{FF2B5EF4-FFF2-40B4-BE49-F238E27FC236}">
-                <a16:creationId xmlns:a16="http://schemas.microsoft.com/office/drawing/2014/main" id="{FBF097AA-AACB-E41A-F8C9-5A3FA7E3A231}"/>
-              </a:ext>
-            </a:extLst>
-          </p:cNvPr>
-          <p:cNvPicPr>
-            <a:picLocks noChangeAspect="1"/>
-          </p:cNvPicPr>
-          <p:nvPr/>
-        </p:nvPicPr>
-        <p:blipFill>
-          <a:blip r:embed="rId2">
-            <a:extLst>
-              <a:ext uri="{28A0092B-C50C-407E-A947-70E740481C1C}">
-                <a14:useLocalDpi xmlns:a14="http://schemas.microsoft.com/office/drawing/2010/main" val="0"/>
-              </a:ext>
-            </a:extLst>
-          </a:blip>
-          <a:stretch>
-            <a:fillRect/>
-          </a:stretch>
-        </p:blipFill>
-        <p:spPr>
-          <a:xfrm>
-            <a:off x="3809995" y="1600196"/>
-            <a:ext cx="4572009" cy="3657607"/>
-          </a:xfrm>
-          <a:prstGeom prst="rect">
-            <a:avLst/>
-          </a:prstGeom>
-        </p:spPr>
-      </p:pic>
-    </p:spTree>
-    <p:extLst>
-      <p:ext uri="{BB962C8B-B14F-4D97-AF65-F5344CB8AC3E}">
-        <p14:creationId xmlns:p14="http://schemas.microsoft.com/office/powerpoint/2010/main" val="3223323773"/>
-      </p:ext>
-    </p:extLst>
-  </p:cSld>
-  <p:clrMapOvr>
-    <a:masterClrMapping/>
-  </p:clrMapOvr>
-</p:sld>
-</file>
-
-<file path=ppt/slides/slide21.xml><?xml version="1.0" encoding="utf-8"?>
-<p:sld xmlns:a="http://schemas.openxmlformats.org/drawingml/2006/main" xmlns:r="http://schemas.openxmlformats.org/officeDocument/2006/relationships" xmlns:p="http://schemas.openxmlformats.org/presentationml/2006/main">
-  <p:cSld>
-    <p:spTree>
-      <p:nvGrpSpPr>
-        <p:cNvPr id="1" name="">
-          <a:extLst>
-            <a:ext uri="{FF2B5EF4-FFF2-40B4-BE49-F238E27FC236}">
-              <a16:creationId xmlns:a16="http://schemas.microsoft.com/office/drawing/2014/main" id="{63F052C4-B740-3B75-4EE3-2F4EEA218213}"/>
-            </a:ext>
-          </a:extLst>
-        </p:cNvPr>
-        <p:cNvGrpSpPr/>
-        <p:nvPr/>
-      </p:nvGrpSpPr>
-      <p:grpSpPr>
-        <a:xfrm>
-          <a:off x="0" y="0"/>
-          <a:ext cx="0" cy="0"/>
-          <a:chOff x="0" y="0"/>
-          <a:chExt cx="0" cy="0"/>
-        </a:xfrm>
-      </p:grpSpPr>
-      <p:pic>
-        <p:nvPicPr>
-          <p:cNvPr id="3" name="Picture 2" descr="A graph of a graph&#10;&#10;Description automatically generated">
-            <a:extLst>
-              <a:ext uri="{FF2B5EF4-FFF2-40B4-BE49-F238E27FC236}">
-                <a16:creationId xmlns:a16="http://schemas.microsoft.com/office/drawing/2014/main" id="{21623C33-E24C-1596-4B88-8289AD96F518}"/>
+          <p:cNvPr id="3" name="Picture 2" descr="A graph of a graph&#10;&#10;Description automatically generated with medium confidence">
+            <a:extLst>
+              <a:ext uri="{FF2B5EF4-FFF2-40B4-BE49-F238E27FC236}">
+                <a16:creationId xmlns:a16="http://schemas.microsoft.com/office/drawing/2014/main" id="{1299CAF1-FA48-1D69-50A8-5A04A2B776A0}"/>
               </a:ext>
             </a:extLst>
           </p:cNvPr>
@@ -5014,7 +4825,7 @@
     </p:spTree>
     <p:extLst>
       <p:ext uri="{BB962C8B-B14F-4D97-AF65-F5344CB8AC3E}">
-        <p14:creationId xmlns:p14="http://schemas.microsoft.com/office/powerpoint/2010/main" val="981264521"/>
+        <p14:creationId xmlns:p14="http://schemas.microsoft.com/office/powerpoint/2010/main" val="572464560"/>
       </p:ext>
     </p:extLst>
   </p:cSld>
@@ -5051,80 +4862,6 @@
       </p:grpSpPr>
       <p:pic>
         <p:nvPicPr>
-          <p:cNvPr id="3" name="Picture 2" descr="A graph of a graph&#10;&#10;Description automatically generated with medium confidence">
-            <a:extLst>
-              <a:ext uri="{FF2B5EF4-FFF2-40B4-BE49-F238E27FC236}">
-                <a16:creationId xmlns:a16="http://schemas.microsoft.com/office/drawing/2014/main" id="{1299CAF1-FA48-1D69-50A8-5A04A2B776A0}"/>
-              </a:ext>
-            </a:extLst>
-          </p:cNvPr>
-          <p:cNvPicPr>
-            <a:picLocks noChangeAspect="1"/>
-          </p:cNvPicPr>
-          <p:nvPr/>
-        </p:nvPicPr>
-        <p:blipFill>
-          <a:blip r:embed="rId2">
-            <a:extLst>
-              <a:ext uri="{28A0092B-C50C-407E-A947-70E740481C1C}">
-                <a14:useLocalDpi xmlns:a14="http://schemas.microsoft.com/office/drawing/2010/main" val="0"/>
-              </a:ext>
-            </a:extLst>
-          </a:blip>
-          <a:stretch>
-            <a:fillRect/>
-          </a:stretch>
-        </p:blipFill>
-        <p:spPr>
-          <a:xfrm>
-            <a:off x="643467" y="1247985"/>
-            <a:ext cx="10905066" cy="4362028"/>
-          </a:xfrm>
-          <a:prstGeom prst="rect">
-            <a:avLst/>
-          </a:prstGeom>
-        </p:spPr>
-      </p:pic>
-    </p:spTree>
-    <p:extLst>
-      <p:ext uri="{BB962C8B-B14F-4D97-AF65-F5344CB8AC3E}">
-        <p14:creationId xmlns:p14="http://schemas.microsoft.com/office/powerpoint/2010/main" val="572464560"/>
-      </p:ext>
-    </p:extLst>
-  </p:cSld>
-  <p:clrMapOvr>
-    <a:masterClrMapping/>
-  </p:clrMapOvr>
-</p:sld>
-</file>
-
-<file path=ppt/slides/slide23.xml><?xml version="1.0" encoding="utf-8"?>
-<p:sld xmlns:a="http://schemas.openxmlformats.org/drawingml/2006/main" xmlns:r="http://schemas.openxmlformats.org/officeDocument/2006/relationships" xmlns:p="http://schemas.openxmlformats.org/presentationml/2006/main">
-  <p:cSld>
-    <p:bg>
-      <p:bgPr>
-        <a:solidFill>
-          <a:schemeClr val="bg1"/>
-        </a:solidFill>
-        <a:effectLst/>
-      </p:bgPr>
-    </p:bg>
-    <p:spTree>
-      <p:nvGrpSpPr>
-        <p:cNvPr id="1" name=""/>
-        <p:cNvGrpSpPr/>
-        <p:nvPr/>
-      </p:nvGrpSpPr>
-      <p:grpSpPr>
-        <a:xfrm>
-          <a:off x="0" y="0"/>
-          <a:ext cx="0" cy="0"/>
-          <a:chOff x="0" y="0"/>
-          <a:chExt cx="0" cy="0"/>
-        </a:xfrm>
-      </p:grpSpPr>
-      <p:pic>
-        <p:nvPicPr>
           <p:cNvPr id="3" name="Picture 2" descr="A graph with lines and numbers&#10;&#10;Description automatically generated">
             <a:extLst>
               <a:ext uri="{FF2B5EF4-FFF2-40B4-BE49-F238E27FC236}">
@@ -5175,12 +4912,94 @@
 <file path=ppt/slides/slide3.xml><?xml version="1.0" encoding="utf-8"?>
 <p:sld xmlns:a="http://schemas.openxmlformats.org/drawingml/2006/main" xmlns:r="http://schemas.openxmlformats.org/officeDocument/2006/relationships" xmlns:p="http://schemas.openxmlformats.org/presentationml/2006/main">
   <p:cSld>
+    <p:bg>
+      <p:bgPr>
+        <a:solidFill>
+          <a:schemeClr val="bg1"/>
+        </a:solidFill>
+        <a:effectLst/>
+      </p:bgPr>
+    </p:bg>
+    <p:spTree>
+      <p:nvGrpSpPr>
+        <p:cNvPr id="1" name=""/>
+        <p:cNvGrpSpPr/>
+        <p:nvPr/>
+      </p:nvGrpSpPr>
+      <p:grpSpPr>
+        <a:xfrm>
+          <a:off x="0" y="0"/>
+          <a:ext cx="0" cy="0"/>
+          <a:chOff x="0" y="0"/>
+          <a:chExt cx="0" cy="0"/>
+        </a:xfrm>
+      </p:grpSpPr>
+      <p:pic>
+        <p:nvPicPr>
+          <p:cNvPr id="4" name="Picture 3" descr="A graph of a graph&#10;&#10;Description automatically generated">
+            <a:extLst>
+              <a:ext uri="{FF2B5EF4-FFF2-40B4-BE49-F238E27FC236}">
+                <a16:creationId xmlns:a16="http://schemas.microsoft.com/office/drawing/2014/main" id="{5D29C6AD-924B-5FE9-EF27-3E48D42CC82A}"/>
+              </a:ext>
+            </a:extLst>
+          </p:cNvPr>
+          <p:cNvPicPr>
+            <a:picLocks noChangeAspect="1"/>
+          </p:cNvPicPr>
+          <p:nvPr/>
+        </p:nvPicPr>
+        <p:blipFill>
+          <a:blip r:embed="rId2">
+            <a:extLst>
+              <a:ext uri="{28A0092B-C50C-407E-A947-70E740481C1C}">
+                <a14:useLocalDpi xmlns:a14="http://schemas.microsoft.com/office/drawing/2010/main" val="0"/>
+              </a:ext>
+            </a:extLst>
+          </a:blip>
+          <a:stretch>
+            <a:fillRect/>
+          </a:stretch>
+        </p:blipFill>
+        <p:spPr>
+          <a:xfrm>
+            <a:off x="643467" y="1247985"/>
+            <a:ext cx="10905066" cy="4362028"/>
+          </a:xfrm>
+          <a:prstGeom prst="rect">
+            <a:avLst/>
+          </a:prstGeom>
+        </p:spPr>
+      </p:pic>
+    </p:spTree>
+    <p:extLst>
+      <p:ext uri="{BB962C8B-B14F-4D97-AF65-F5344CB8AC3E}">
+        <p14:creationId xmlns:p14="http://schemas.microsoft.com/office/powerpoint/2010/main" val="376781030"/>
+      </p:ext>
+    </p:extLst>
+  </p:cSld>
+  <p:clrMapOvr>
+    <a:masterClrMapping/>
+  </p:clrMapOvr>
+</p:sld>
+</file>
+
+<file path=ppt/slides/slide4.xml><?xml version="1.0" encoding="utf-8"?>
+<p:sld xmlns:a="http://schemas.openxmlformats.org/drawingml/2006/main" xmlns:r="http://schemas.openxmlformats.org/officeDocument/2006/relationships" xmlns:p="http://schemas.openxmlformats.org/presentationml/2006/main">
+  <p:cSld>
+    <p:bg>
+      <p:bgPr>
+        <a:solidFill>
+          <a:schemeClr val="bg1"/>
+        </a:solidFill>
+        <a:effectLst/>
+      </p:bgPr>
+    </p:bg>
     <p:spTree>
       <p:nvGrpSpPr>
         <p:cNvPr id="1" name="">
           <a:extLst>
             <a:ext uri="{FF2B5EF4-FFF2-40B4-BE49-F238E27FC236}">
-              <a16:creationId xmlns:a16="http://schemas.microsoft.com/office/drawing/2014/main" id="{FF42B5C8-9855-AC68-0E95-35DA575C96A0}"/>
+              <a16:creationId xmlns:a16="http://schemas.microsoft.com/office/drawing/2014/main" id="{EFA75E66-ACB4-D5BA-3EDD-3409911E2F6F}"/>
             </a:ext>
           </a:extLst>
         </p:cNvPr>
@@ -5197,10 +5016,10 @@
       </p:grpSpPr>
       <p:pic>
         <p:nvPicPr>
-          <p:cNvPr id="3" name="Picture 2" descr="A screenshot of a computer&#10;&#10;Description automatically generated">
-            <a:extLst>
-              <a:ext uri="{FF2B5EF4-FFF2-40B4-BE49-F238E27FC236}">
-                <a16:creationId xmlns:a16="http://schemas.microsoft.com/office/drawing/2014/main" id="{78D63DD2-0117-9881-3B69-4DB4FB03981C}"/>
+          <p:cNvPr id="6" name="Picture 5" descr="A graph of a number of data&#10;&#10;Description automatically generated with medium confidence">
+            <a:extLst>
+              <a:ext uri="{FF2B5EF4-FFF2-40B4-BE49-F238E27FC236}">
+                <a16:creationId xmlns:a16="http://schemas.microsoft.com/office/drawing/2014/main" id="{089CE0BE-D44D-5904-6524-50EA801E9A81}"/>
               </a:ext>
             </a:extLst>
           </p:cNvPr>
@@ -5217,48 +5036,14 @@
               </a:ext>
             </a:extLst>
           </a:blip>
-          <a:srcRect r="39339"/>
-          <a:stretch/>
+          <a:stretch>
+            <a:fillRect/>
+          </a:stretch>
         </p:blipFill>
         <p:spPr>
           <a:xfrm>
-            <a:off x="643467" y="1002622"/>
-            <a:ext cx="6615172" cy="4852755"/>
-          </a:xfrm>
-          <a:prstGeom prst="rect">
-            <a:avLst/>
-          </a:prstGeom>
-        </p:spPr>
-      </p:pic>
-      <p:pic>
-        <p:nvPicPr>
-          <p:cNvPr id="2" name="Picture 1" descr="A screenshot of a computer&#10;&#10;Description automatically generated">
-            <a:extLst>
-              <a:ext uri="{FF2B5EF4-FFF2-40B4-BE49-F238E27FC236}">
-                <a16:creationId xmlns:a16="http://schemas.microsoft.com/office/drawing/2014/main" id="{C0154925-AEE5-FA6A-DF52-79ED6DD0F131}"/>
-              </a:ext>
-            </a:extLst>
-          </p:cNvPr>
-          <p:cNvPicPr>
-            <a:picLocks noChangeAspect="1"/>
-          </p:cNvPicPr>
-          <p:nvPr/>
-        </p:nvPicPr>
-        <p:blipFill>
-          <a:blip r:embed="rId2">
-            <a:extLst>
-              <a:ext uri="{28A0092B-C50C-407E-A947-70E740481C1C}">
-                <a14:useLocalDpi xmlns:a14="http://schemas.microsoft.com/office/drawing/2010/main" val="0"/>
-              </a:ext>
-            </a:extLst>
-          </a:blip>
-          <a:srcRect l="88410"/>
-          <a:stretch/>
-        </p:blipFill>
-        <p:spPr>
-          <a:xfrm>
-            <a:off x="7258639" y="1002622"/>
-            <a:ext cx="1263890" cy="4852755"/>
+            <a:off x="1922920" y="643466"/>
+            <a:ext cx="8346160" cy="5571067"/>
           </a:xfrm>
           <a:prstGeom prst="rect">
             <a:avLst/>
@@ -5268,79 +5053,7 @@
     </p:spTree>
     <p:extLst>
       <p:ext uri="{BB962C8B-B14F-4D97-AF65-F5344CB8AC3E}">
-        <p14:creationId xmlns:p14="http://schemas.microsoft.com/office/powerpoint/2010/main" val="780273432"/>
-      </p:ext>
-    </p:extLst>
-  </p:cSld>
-  <p:clrMapOvr>
-    <a:masterClrMapping/>
-  </p:clrMapOvr>
-</p:sld>
-</file>
-
-<file path=ppt/slides/slide4.xml><?xml version="1.0" encoding="utf-8"?>
-<p:sld xmlns:a="http://schemas.openxmlformats.org/drawingml/2006/main" xmlns:r="http://schemas.openxmlformats.org/officeDocument/2006/relationships" xmlns:p="http://schemas.openxmlformats.org/presentationml/2006/main">
-  <p:cSld>
-    <p:spTree>
-      <p:nvGrpSpPr>
-        <p:cNvPr id="1" name="">
-          <a:extLst>
-            <a:ext uri="{FF2B5EF4-FFF2-40B4-BE49-F238E27FC236}">
-              <a16:creationId xmlns:a16="http://schemas.microsoft.com/office/drawing/2014/main" id="{EB104D9B-C0B9-4296-DDBE-1BB72DA707E4}"/>
-            </a:ext>
-          </a:extLst>
-        </p:cNvPr>
-        <p:cNvGrpSpPr/>
-        <p:nvPr/>
-      </p:nvGrpSpPr>
-      <p:grpSpPr>
-        <a:xfrm>
-          <a:off x="0" y="0"/>
-          <a:ext cx="0" cy="0"/>
-          <a:chOff x="0" y="0"/>
-          <a:chExt cx="0" cy="0"/>
-        </a:xfrm>
-      </p:grpSpPr>
-      <p:pic>
-        <p:nvPicPr>
-          <p:cNvPr id="3" name="Picture 2" descr="A screenshot of a computer&#10;&#10;Description automatically generated">
-            <a:extLst>
-              <a:ext uri="{FF2B5EF4-FFF2-40B4-BE49-F238E27FC236}">
-                <a16:creationId xmlns:a16="http://schemas.microsoft.com/office/drawing/2014/main" id="{ED383448-591D-8707-4B78-3DC3CC56476A}"/>
-              </a:ext>
-            </a:extLst>
-          </p:cNvPr>
-          <p:cNvPicPr>
-            <a:picLocks noChangeAspect="1"/>
-          </p:cNvPicPr>
-          <p:nvPr/>
-        </p:nvPicPr>
-        <p:blipFill>
-          <a:blip r:embed="rId2">
-            <a:extLst>
-              <a:ext uri="{28A0092B-C50C-407E-A947-70E740481C1C}">
-                <a14:useLocalDpi xmlns:a14="http://schemas.microsoft.com/office/drawing/2010/main" val="0"/>
-              </a:ext>
-            </a:extLst>
-          </a:blip>
-          <a:stretch>
-            <a:fillRect/>
-          </a:stretch>
-        </p:blipFill>
-        <p:spPr>
-          <a:xfrm>
-            <a:off x="643467" y="1002622"/>
-            <a:ext cx="10905066" cy="4852755"/>
-          </a:xfrm>
-          <a:prstGeom prst="rect">
-            <a:avLst/>
-          </a:prstGeom>
-        </p:spPr>
-      </p:pic>
-    </p:spTree>
-    <p:extLst>
-      <p:ext uri="{BB962C8B-B14F-4D97-AF65-F5344CB8AC3E}">
-        <p14:creationId xmlns:p14="http://schemas.microsoft.com/office/powerpoint/2010/main" val="3428200222"/>
+        <p14:creationId xmlns:p14="http://schemas.microsoft.com/office/powerpoint/2010/main" val="2923422350"/>
       </p:ext>
     </p:extLst>
   </p:cSld>
@@ -5358,7 +5071,7 @@
         <p:cNvPr id="1" name="">
           <a:extLst>
             <a:ext uri="{FF2B5EF4-FFF2-40B4-BE49-F238E27FC236}">
-              <a16:creationId xmlns:a16="http://schemas.microsoft.com/office/drawing/2014/main" id="{56583CB1-6E91-91FE-149C-F02B242C76F2}"/>
+              <a16:creationId xmlns:a16="http://schemas.microsoft.com/office/drawing/2014/main" id="{D7B60A9C-82F4-0DA2-940F-4136FC529D27}"/>
             </a:ext>
           </a:extLst>
         </p:cNvPr>
@@ -5373,115 +5086,45 @@
           <a:chExt cx="0" cy="0"/>
         </a:xfrm>
       </p:grpSpPr>
-      <p:pic>
-        <p:nvPicPr>
-          <p:cNvPr id="3" name="Picture 2" descr="A screenshot of a graph&#10;&#10;Description automatically generated with medium confidence">
-            <a:extLst>
-              <a:ext uri="{FF2B5EF4-FFF2-40B4-BE49-F238E27FC236}">
-                <a16:creationId xmlns:a16="http://schemas.microsoft.com/office/drawing/2014/main" id="{DACFC184-2BBA-7D5B-4998-CD26BD9AD496}"/>
-              </a:ext>
-            </a:extLst>
-          </p:cNvPr>
-          <p:cNvPicPr>
-            <a:picLocks noChangeAspect="1"/>
-          </p:cNvPicPr>
+      <p:sp>
+        <p:nvSpPr>
+          <p:cNvPr id="2" name="TextBox 1">
+            <a:extLst>
+              <a:ext uri="{FF2B5EF4-FFF2-40B4-BE49-F238E27FC236}">
+                <a16:creationId xmlns:a16="http://schemas.microsoft.com/office/drawing/2014/main" id="{8BAFBE54-3061-FB44-2B26-F69D2B4D7E39}"/>
+              </a:ext>
+            </a:extLst>
+          </p:cNvPr>
+          <p:cNvSpPr txBox="1"/>
           <p:nvPr/>
-        </p:nvPicPr>
-        <p:blipFill>
-          <a:blip r:embed="rId2">
-            <a:extLst>
-              <a:ext uri="{28A0092B-C50C-407E-A947-70E740481C1C}">
-                <a14:useLocalDpi xmlns:a14="http://schemas.microsoft.com/office/drawing/2010/main" val="0"/>
-              </a:ext>
-            </a:extLst>
-          </a:blip>
-          <a:srcRect r="66724"/>
-          <a:stretch/>
-        </p:blipFill>
+        </p:nvSpPr>
         <p:spPr>
           <a:xfrm>
-            <a:off x="609589" y="685794"/>
-            <a:ext cx="3651326" cy="5486411"/>
+            <a:off x="519776" y="1305341"/>
+            <a:ext cx="7088415" cy="553998"/>
           </a:xfrm>
           <a:prstGeom prst="rect">
             <a:avLst/>
           </a:prstGeom>
+          <a:noFill/>
         </p:spPr>
-      </p:pic>
-      <p:pic>
-        <p:nvPicPr>
-          <p:cNvPr id="4" name="Picture 3" descr="A screenshot of a graph&#10;&#10;Description automatically generated with medium confidence">
-            <a:extLst>
-              <a:ext uri="{FF2B5EF4-FFF2-40B4-BE49-F238E27FC236}">
-                <a16:creationId xmlns:a16="http://schemas.microsoft.com/office/drawing/2014/main" id="{0600D70A-FD68-4269-ABDB-C3CA08998946}"/>
-              </a:ext>
-            </a:extLst>
-          </p:cNvPr>
-          <p:cNvPicPr>
-            <a:picLocks noChangeAspect="1"/>
-          </p:cNvPicPr>
-          <p:nvPr/>
-        </p:nvPicPr>
-        <p:blipFill>
-          <a:blip r:embed="rId2">
-            <a:extLst>
-              <a:ext uri="{28A0092B-C50C-407E-A947-70E740481C1C}">
-                <a14:useLocalDpi xmlns:a14="http://schemas.microsoft.com/office/drawing/2010/main" val="0"/>
-              </a:ext>
-            </a:extLst>
-          </a:blip>
-          <a:srcRect l="87142"/>
-          <a:stretch/>
-        </p:blipFill>
-        <p:spPr>
-          <a:xfrm>
-            <a:off x="4326903" y="685794"/>
-            <a:ext cx="1410889" cy="5486411"/>
-          </a:xfrm>
-          <a:prstGeom prst="rect">
-            <a:avLst/>
-          </a:prstGeom>
-        </p:spPr>
-      </p:pic>
-      <p:pic>
-        <p:nvPicPr>
-          <p:cNvPr id="5" name="Picture 4" descr="A screenshot of a graph&#10;&#10;Description automatically generated with medium confidence">
-            <a:extLst>
-              <a:ext uri="{FF2B5EF4-FFF2-40B4-BE49-F238E27FC236}">
-                <a16:creationId xmlns:a16="http://schemas.microsoft.com/office/drawing/2014/main" id="{549F7C3E-75AC-050B-8743-95FBAAE7970B}"/>
-              </a:ext>
-            </a:extLst>
-          </p:cNvPr>
-          <p:cNvPicPr>
-            <a:picLocks noChangeAspect="1"/>
-          </p:cNvPicPr>
-          <p:nvPr/>
-        </p:nvPicPr>
-        <p:blipFill>
-          <a:blip r:embed="rId2">
-            <a:extLst>
-              <a:ext uri="{28A0092B-C50C-407E-A947-70E740481C1C}">
-                <a14:useLocalDpi xmlns:a14="http://schemas.microsoft.com/office/drawing/2010/main" val="0"/>
-              </a:ext>
-            </a:extLst>
-          </a:blip>
-          <a:srcRect l="41337" t="95891" r="47323"/>
-          <a:stretch/>
-        </p:blipFill>
-        <p:spPr>
-          <a:xfrm>
-            <a:off x="2205873" y="5956169"/>
-            <a:ext cx="1244337" cy="225463"/>
-          </a:xfrm>
-          <a:prstGeom prst="rect">
-            <a:avLst/>
-          </a:prstGeom>
-        </p:spPr>
-      </p:pic>
+        <p:txBody>
+          <a:bodyPr wrap="none" rtlCol="0">
+            <a:spAutoFit/>
+          </a:bodyPr>
+          <a:lstStyle/>
+          <a:p>
+            <a:r>
+              <a:rPr lang="en-US" sz="3000" dirty="0"/>
+              <a:t>What makes an incubation strategy good?</a:t>
+            </a:r>
+          </a:p>
+        </p:txBody>
+      </p:sp>
     </p:spTree>
     <p:extLst>
       <p:ext uri="{BB962C8B-B14F-4D97-AF65-F5344CB8AC3E}">
-        <p14:creationId xmlns:p14="http://schemas.microsoft.com/office/powerpoint/2010/main" val="1567049475"/>
+        <p14:creationId xmlns:p14="http://schemas.microsoft.com/office/powerpoint/2010/main" val="1918914705"/>
       </p:ext>
     </p:extLst>
   </p:cSld>
@@ -5492,112 +5135,6 @@
 </file>
 
 <file path=ppt/slides/slide6.xml><?xml version="1.0" encoding="utf-8"?>
-<p:sld xmlns:a="http://schemas.openxmlformats.org/drawingml/2006/main" xmlns:r="http://schemas.openxmlformats.org/officeDocument/2006/relationships" xmlns:p="http://schemas.openxmlformats.org/presentationml/2006/main">
-  <p:cSld>
-    <p:spTree>
-      <p:nvGrpSpPr>
-        <p:cNvPr id="1" name="">
-          <a:extLst>
-            <a:ext uri="{FF2B5EF4-FFF2-40B4-BE49-F238E27FC236}">
-              <a16:creationId xmlns:a16="http://schemas.microsoft.com/office/drawing/2014/main" id="{32281031-0089-47FB-B363-933D7589B1F2}"/>
-            </a:ext>
-          </a:extLst>
-        </p:cNvPr>
-        <p:cNvGrpSpPr/>
-        <p:nvPr/>
-      </p:nvGrpSpPr>
-      <p:grpSpPr>
-        <a:xfrm>
-          <a:off x="0" y="0"/>
-          <a:ext cx="0" cy="0"/>
-          <a:chOff x="0" y="0"/>
-          <a:chExt cx="0" cy="0"/>
-        </a:xfrm>
-      </p:grpSpPr>
-      <p:pic>
-        <p:nvPicPr>
-          <p:cNvPr id="3" name="Picture 2" descr="A screenshot of a graph&#10;&#10;Description automatically generated with medium confidence">
-            <a:extLst>
-              <a:ext uri="{FF2B5EF4-FFF2-40B4-BE49-F238E27FC236}">
-                <a16:creationId xmlns:a16="http://schemas.microsoft.com/office/drawing/2014/main" id="{D89DFCBC-F59E-A3E3-F104-6374ECBE850F}"/>
-              </a:ext>
-            </a:extLst>
-          </p:cNvPr>
-          <p:cNvPicPr>
-            <a:picLocks noChangeAspect="1"/>
-          </p:cNvPicPr>
-          <p:nvPr/>
-        </p:nvPicPr>
-        <p:blipFill>
-          <a:blip r:embed="rId2">
-            <a:extLst>
-              <a:ext uri="{28A0092B-C50C-407E-A947-70E740481C1C}">
-                <a14:useLocalDpi xmlns:a14="http://schemas.microsoft.com/office/drawing/2010/main" val="0"/>
-              </a:ext>
-            </a:extLst>
-          </a:blip>
-          <a:srcRect r="40349"/>
-          <a:stretch/>
-        </p:blipFill>
-        <p:spPr>
-          <a:xfrm>
-            <a:off x="609589" y="685794"/>
-            <a:ext cx="6545355" cy="5486411"/>
-          </a:xfrm>
-          <a:prstGeom prst="rect">
-            <a:avLst/>
-          </a:prstGeom>
-        </p:spPr>
-      </p:pic>
-      <p:pic>
-        <p:nvPicPr>
-          <p:cNvPr id="2" name="Picture 1" descr="A screenshot of a graph&#10;&#10;Description automatically generated with medium confidence">
-            <a:extLst>
-              <a:ext uri="{FF2B5EF4-FFF2-40B4-BE49-F238E27FC236}">
-                <a16:creationId xmlns:a16="http://schemas.microsoft.com/office/drawing/2014/main" id="{DDDE919B-7554-C1E2-73A5-C3DF9D5BF236}"/>
-              </a:ext>
-            </a:extLst>
-          </p:cNvPr>
-          <p:cNvPicPr>
-            <a:picLocks noChangeAspect="1"/>
-          </p:cNvPicPr>
-          <p:nvPr/>
-        </p:nvPicPr>
-        <p:blipFill>
-          <a:blip r:embed="rId2">
-            <a:extLst>
-              <a:ext uri="{28A0092B-C50C-407E-A947-70E740481C1C}">
-                <a14:useLocalDpi xmlns:a14="http://schemas.microsoft.com/office/drawing/2010/main" val="0"/>
-              </a:ext>
-            </a:extLst>
-          </a:blip>
-          <a:srcRect l="87142"/>
-          <a:stretch/>
-        </p:blipFill>
-        <p:spPr>
-          <a:xfrm>
-            <a:off x="7154944" y="685794"/>
-            <a:ext cx="1410889" cy="5486411"/>
-          </a:xfrm>
-          <a:prstGeom prst="rect">
-            <a:avLst/>
-          </a:prstGeom>
-        </p:spPr>
-      </p:pic>
-    </p:spTree>
-    <p:extLst>
-      <p:ext uri="{BB962C8B-B14F-4D97-AF65-F5344CB8AC3E}">
-        <p14:creationId xmlns:p14="http://schemas.microsoft.com/office/powerpoint/2010/main" val="4135404832"/>
-      </p:ext>
-    </p:extLst>
-  </p:cSld>
-  <p:clrMapOvr>
-    <a:masterClrMapping/>
-  </p:clrMapOvr>
-</p:sld>
-</file>
-
-<file path=ppt/slides/slide7.xml><?xml version="1.0" encoding="utf-8"?>
 <p:sld xmlns:a="http://schemas.openxmlformats.org/drawingml/2006/main" xmlns:r="http://schemas.openxmlformats.org/officeDocument/2006/relationships" xmlns:p="http://schemas.openxmlformats.org/presentationml/2006/main">
   <p:cSld>
     <p:spTree>
@@ -5622,10 +5159,10 @@
       </p:grpSpPr>
       <p:pic>
         <p:nvPicPr>
-          <p:cNvPr id="3" name="Picture 2" descr="A screenshot of a graph&#10;&#10;Description automatically generated with medium confidence">
-            <a:extLst>
-              <a:ext uri="{FF2B5EF4-FFF2-40B4-BE49-F238E27FC236}">
-                <a16:creationId xmlns:a16="http://schemas.microsoft.com/office/drawing/2014/main" id="{E6633AED-8D00-DD59-8DE7-6227FE12092B}"/>
+          <p:cNvPr id="4" name="Picture 3" descr="A close-up of a grid&#10;&#10;Description automatically generated">
+            <a:extLst>
+              <a:ext uri="{FF2B5EF4-FFF2-40B4-BE49-F238E27FC236}">
+                <a16:creationId xmlns:a16="http://schemas.microsoft.com/office/drawing/2014/main" id="{30414F43-BBBB-AA7A-7930-00232E104D2C}"/>
               </a:ext>
             </a:extLst>
           </p:cNvPr>
@@ -5669,6 +5206,115 @@
 </p:sld>
 </file>
 
+<file path=ppt/slides/slide7.xml><?xml version="1.0" encoding="utf-8"?>
+<p:sld xmlns:a="http://schemas.openxmlformats.org/drawingml/2006/main" xmlns:r="http://schemas.openxmlformats.org/officeDocument/2006/relationships" xmlns:p="http://schemas.openxmlformats.org/presentationml/2006/main">
+  <p:cSld>
+    <p:bg>
+      <p:bgPr>
+        <a:solidFill>
+          <a:schemeClr val="bg1"/>
+        </a:solidFill>
+        <a:effectLst/>
+      </p:bgPr>
+    </p:bg>
+    <p:spTree>
+      <p:nvGrpSpPr>
+        <p:cNvPr id="1" name=""/>
+        <p:cNvGrpSpPr/>
+        <p:nvPr/>
+      </p:nvGrpSpPr>
+      <p:grpSpPr>
+        <a:xfrm>
+          <a:off x="0" y="0"/>
+          <a:ext cx="0" cy="0"/>
+          <a:chOff x="0" y="0"/>
+          <a:chExt cx="0" cy="0"/>
+        </a:xfrm>
+      </p:grpSpPr>
+      <p:pic>
+        <p:nvPicPr>
+          <p:cNvPr id="3" name="Picture 2" descr="A graph of a graph&#10;&#10;Description automatically generated with medium confidence">
+            <a:extLst>
+              <a:ext uri="{FF2B5EF4-FFF2-40B4-BE49-F238E27FC236}">
+                <a16:creationId xmlns:a16="http://schemas.microsoft.com/office/drawing/2014/main" id="{5AE4C1E1-C29C-AE2D-972E-1A942C5784F9}"/>
+              </a:ext>
+            </a:extLst>
+          </p:cNvPr>
+          <p:cNvPicPr>
+            <a:picLocks noChangeAspect="1"/>
+          </p:cNvPicPr>
+          <p:nvPr/>
+        </p:nvPicPr>
+        <p:blipFill>
+          <a:blip r:embed="rId2">
+            <a:extLst>
+              <a:ext uri="{28A0092B-C50C-407E-A947-70E740481C1C}">
+                <a14:useLocalDpi xmlns:a14="http://schemas.microsoft.com/office/drawing/2010/main" val="0"/>
+              </a:ext>
+            </a:extLst>
+          </a:blip>
+          <a:stretch>
+            <a:fillRect/>
+          </a:stretch>
+        </p:blipFill>
+        <p:spPr>
+          <a:xfrm>
+            <a:off x="643467" y="1616031"/>
+            <a:ext cx="10905066" cy="3625937"/>
+          </a:xfrm>
+          <a:prstGeom prst="rect">
+            <a:avLst/>
+          </a:prstGeom>
+        </p:spPr>
+      </p:pic>
+      <p:sp>
+        <p:nvSpPr>
+          <p:cNvPr id="4" name="TextBox 3">
+            <a:extLst>
+              <a:ext uri="{FF2B5EF4-FFF2-40B4-BE49-F238E27FC236}">
+                <a16:creationId xmlns:a16="http://schemas.microsoft.com/office/drawing/2014/main" id="{EA76C92B-CC70-B763-E352-059F4844CE2F}"/>
+              </a:ext>
+            </a:extLst>
+          </p:cNvPr>
+          <p:cNvSpPr txBox="1"/>
+          <p:nvPr/>
+        </p:nvSpPr>
+        <p:spPr>
+          <a:xfrm>
+            <a:off x="544031" y="422622"/>
+            <a:ext cx="5551969" cy="369332"/>
+          </a:xfrm>
+          <a:prstGeom prst="rect">
+            <a:avLst/>
+          </a:prstGeom>
+          <a:noFill/>
+        </p:spPr>
+        <p:txBody>
+          <a:bodyPr wrap="none" rtlCol="0">
+            <a:spAutoFit/>
+          </a:bodyPr>
+          <a:lstStyle/>
+          <a:p>
+            <a:r>
+              <a:rPr lang="en-US" dirty="0"/>
+              <a:t>Different strategies in regular environment (150 kJ/day)</a:t>
+            </a:r>
+          </a:p>
+        </p:txBody>
+      </p:sp>
+    </p:spTree>
+    <p:extLst>
+      <p:ext uri="{BB962C8B-B14F-4D97-AF65-F5344CB8AC3E}">
+        <p14:creationId xmlns:p14="http://schemas.microsoft.com/office/powerpoint/2010/main" val="1709521567"/>
+      </p:ext>
+    </p:extLst>
+  </p:cSld>
+  <p:clrMapOvr>
+    <a:masterClrMapping/>
+  </p:clrMapOvr>
+</p:sld>
+</file>
+
 <file path=ppt/slides/slide8.xml><?xml version="1.0" encoding="utf-8"?>
 <p:sld xmlns:a="http://schemas.openxmlformats.org/drawingml/2006/main" xmlns:r="http://schemas.openxmlformats.org/officeDocument/2006/relationships" xmlns:p="http://schemas.openxmlformats.org/presentationml/2006/main">
   <p:cSld>
@@ -5677,7 +5323,7 @@
         <p:cNvPr id="1" name="">
           <a:extLst>
             <a:ext uri="{FF2B5EF4-FFF2-40B4-BE49-F238E27FC236}">
-              <a16:creationId xmlns:a16="http://schemas.microsoft.com/office/drawing/2014/main" id="{2F9FBC07-C256-127D-BE09-E5B43CA7505F}"/>
+              <a16:creationId xmlns:a16="http://schemas.microsoft.com/office/drawing/2014/main" id="{7869A708-7F53-73DD-C137-CCC30679A99D}"/>
             </a:ext>
           </a:extLst>
         </p:cNvPr>
@@ -5694,10 +5340,10 @@
       </p:grpSpPr>
       <p:pic>
         <p:nvPicPr>
-          <p:cNvPr id="3" name="Picture 2" descr="A graph of a graph&#10;&#10;Description automatically generated with medium confidence">
-            <a:extLst>
-              <a:ext uri="{FF2B5EF4-FFF2-40B4-BE49-F238E27FC236}">
-                <a16:creationId xmlns:a16="http://schemas.microsoft.com/office/drawing/2014/main" id="{2C2BC088-C53E-37F9-C7B6-6B29637B0C73}"/>
+          <p:cNvPr id="3" name="Picture 2" descr="A graph of a graph showing the same graph&#10;&#10;Description automatically generated with medium confidence">
+            <a:extLst>
+              <a:ext uri="{FF2B5EF4-FFF2-40B4-BE49-F238E27FC236}">
+                <a16:creationId xmlns:a16="http://schemas.microsoft.com/office/drawing/2014/main" id="{B6820AEC-7A42-FB77-77BC-757E56AA1675}"/>
               </a:ext>
             </a:extLst>
           </p:cNvPr>
@@ -5707,20 +5353,21 @@
           <p:nvPr/>
         </p:nvPicPr>
         <p:blipFill>
-          <a:blip r:embed="rId2">
+          <a:blip r:embed="rId3">
             <a:extLst>
               <a:ext uri="{28A0092B-C50C-407E-A947-70E740481C1C}">
                 <a14:useLocalDpi xmlns:a14="http://schemas.microsoft.com/office/drawing/2010/main" val="0"/>
               </a:ext>
             </a:extLst>
           </a:blip>
-          <a:srcRect r="15407"/>
-          <a:stretch/>
+          <a:stretch>
+            <a:fillRect/>
+          </a:stretch>
         </p:blipFill>
         <p:spPr>
           <a:xfrm>
-            <a:off x="3352795" y="1142995"/>
-            <a:ext cx="4641136" cy="4572009"/>
+            <a:off x="1523990" y="1600196"/>
+            <a:ext cx="9144019" cy="3657607"/>
           </a:xfrm>
           <a:prstGeom prst="rect">
             <a:avLst/>
@@ -5730,7 +5377,7 @@
     </p:spTree>
     <p:extLst>
       <p:ext uri="{BB962C8B-B14F-4D97-AF65-F5344CB8AC3E}">
-        <p14:creationId xmlns:p14="http://schemas.microsoft.com/office/powerpoint/2010/main" val="3665313451"/>
+        <p14:creationId xmlns:p14="http://schemas.microsoft.com/office/powerpoint/2010/main" val="559825348"/>
       </p:ext>
     </p:extLst>
   </p:cSld>
@@ -5745,7 +5392,13 @@
   <p:cSld>
     <p:spTree>
       <p:nvGrpSpPr>
-        <p:cNvPr id="1" name=""/>
+        <p:cNvPr id="1" name="">
+          <a:extLst>
+            <a:ext uri="{FF2B5EF4-FFF2-40B4-BE49-F238E27FC236}">
+              <a16:creationId xmlns:a16="http://schemas.microsoft.com/office/drawing/2014/main" id="{43ADF163-4A10-FD45-4E74-55F466ACFD79}"/>
+            </a:ext>
+          </a:extLst>
+        </p:cNvPr>
         <p:cNvGrpSpPr/>
         <p:nvPr/>
       </p:nvGrpSpPr>
@@ -5757,46 +5410,45 @@
           <a:chExt cx="0" cy="0"/>
         </a:xfrm>
       </p:grpSpPr>
-      <p:pic>
-        <p:nvPicPr>
-          <p:cNvPr id="5" name="Picture 4" descr="A graph of a graph&#10;&#10;Description automatically generated">
-            <a:extLst>
-              <a:ext uri="{FF2B5EF4-FFF2-40B4-BE49-F238E27FC236}">
-                <a16:creationId xmlns:a16="http://schemas.microsoft.com/office/drawing/2014/main" id="{16FD1ECE-310F-FE10-C0A1-4BC119D83A57}"/>
-              </a:ext>
-            </a:extLst>
-          </p:cNvPr>
-          <p:cNvPicPr>
-            <a:picLocks noChangeAspect="1"/>
-          </p:cNvPicPr>
+      <p:sp>
+        <p:nvSpPr>
+          <p:cNvPr id="2" name="TextBox 1">
+            <a:extLst>
+              <a:ext uri="{FF2B5EF4-FFF2-40B4-BE49-F238E27FC236}">
+                <a16:creationId xmlns:a16="http://schemas.microsoft.com/office/drawing/2014/main" id="{9C4FC234-C814-7A2A-0E87-9A1C5DD77F78}"/>
+              </a:ext>
+            </a:extLst>
+          </p:cNvPr>
+          <p:cNvSpPr txBox="1"/>
           <p:nvPr/>
-        </p:nvPicPr>
-        <p:blipFill>
-          <a:blip r:embed="rId2">
-            <a:extLst>
-              <a:ext uri="{28A0092B-C50C-407E-A947-70E740481C1C}">
-                <a14:useLocalDpi xmlns:a14="http://schemas.microsoft.com/office/drawing/2010/main" val="0"/>
-              </a:ext>
-            </a:extLst>
-          </a:blip>
-          <a:stretch>
-            <a:fillRect/>
-          </a:stretch>
-        </p:blipFill>
+        </p:nvSpPr>
         <p:spPr>
           <a:xfrm>
-            <a:off x="3352794" y="1142995"/>
-            <a:ext cx="5486411" cy="4572009"/>
+            <a:off x="519776" y="1305341"/>
+            <a:ext cx="8550289" cy="553998"/>
           </a:xfrm>
           <a:prstGeom prst="rect">
             <a:avLst/>
           </a:prstGeom>
+          <a:noFill/>
         </p:spPr>
-      </p:pic>
+        <p:txBody>
+          <a:bodyPr wrap="none" rtlCol="0">
+            <a:spAutoFit/>
+          </a:bodyPr>
+          <a:lstStyle/>
+          <a:p>
+            <a:r>
+              <a:rPr lang="en-US" sz="3000" dirty="0"/>
+              <a:t>Are strategies good individually, or in combination?</a:t>
+            </a:r>
+          </a:p>
+        </p:txBody>
+      </p:sp>
     </p:spTree>
     <p:extLst>
       <p:ext uri="{BB962C8B-B14F-4D97-AF65-F5344CB8AC3E}">
-        <p14:creationId xmlns:p14="http://schemas.microsoft.com/office/powerpoint/2010/main" val="1753272464"/>
+        <p14:creationId xmlns:p14="http://schemas.microsoft.com/office/powerpoint/2010/main" val="1040207107"/>
       </p:ext>
     </p:extLst>
   </p:cSld>

</xml_diff>

<commit_message>
working on variation in total neglect
</commit_message>
<xml_diff>
--- a/SICB/SICB2025.pptx
+++ b/SICB/SICB2025.pptx
@@ -5,7 +5,7 @@
     <p:sldMasterId id="2147483648" r:id="rId1"/>
   </p:sldMasterIdLst>
   <p:notesMasterIdLst>
-    <p:notesMasterId r:id="rId24"/>
+    <p:notesMasterId r:id="rId23"/>
   </p:notesMasterIdLst>
   <p:sldIdLst>
     <p:sldId id="300" r:id="rId2"/>
@@ -20,16 +20,15 @@
     <p:sldId id="298" r:id="rId11"/>
     <p:sldId id="309" r:id="rId12"/>
     <p:sldId id="308" r:id="rId13"/>
-    <p:sldId id="299" r:id="rId14"/>
-    <p:sldId id="306" r:id="rId15"/>
-    <p:sldId id="284" r:id="rId16"/>
-    <p:sldId id="268" r:id="rId17"/>
-    <p:sldId id="307" r:id="rId18"/>
-    <p:sldId id="269" r:id="rId19"/>
-    <p:sldId id="270" r:id="rId20"/>
-    <p:sldId id="294" r:id="rId21"/>
-    <p:sldId id="295" r:id="rId22"/>
-    <p:sldId id="296" r:id="rId23"/>
+    <p:sldId id="306" r:id="rId14"/>
+    <p:sldId id="284" r:id="rId15"/>
+    <p:sldId id="268" r:id="rId16"/>
+    <p:sldId id="307" r:id="rId17"/>
+    <p:sldId id="269" r:id="rId18"/>
+    <p:sldId id="294" r:id="rId19"/>
+    <p:sldId id="295" r:id="rId20"/>
+    <p:sldId id="296" r:id="rId21"/>
+    <p:sldId id="270" r:id="rId22"/>
   </p:sldIdLst>
   <p:sldSz cx="12192000" cy="6858000"/>
   <p:notesSz cx="6858000" cy="9144000"/>
@@ -145,16 +144,15 @@
             <p14:sldId id="298"/>
             <p14:sldId id="309"/>
             <p14:sldId id="308"/>
-            <p14:sldId id="299"/>
             <p14:sldId id="306"/>
             <p14:sldId id="284"/>
             <p14:sldId id="268"/>
             <p14:sldId id="307"/>
             <p14:sldId id="269"/>
-            <p14:sldId id="270"/>
             <p14:sldId id="294"/>
             <p14:sldId id="295"/>
             <p14:sldId id="296"/>
+            <p14:sldId id="270"/>
           </p14:sldIdLst>
         </p14:section>
       </p14:sectionLst>
@@ -248,7 +246,7 @@
           <a:p>
             <a:fld id="{7BD143C5-AA8C-4920-BD2C-B4B9239CEEBC}" type="datetimeFigureOut">
               <a:rPr lang="en-US" smtClean="0"/>
-              <a:t>12/19/2024</a:t>
+              <a:t>12/21/2024</a:t>
             </a:fld>
             <a:endParaRPr lang="en-US"/>
           </a:p>
@@ -770,7 +768,7 @@
           <a:p>
             <a:fld id="{1C1BBDF2-9A12-4067-84DF-8DD5947A1DA9}" type="datetimeFigureOut">
               <a:rPr lang="en-US" smtClean="0"/>
-              <a:t>12/19/2024</a:t>
+              <a:t>12/21/2024</a:t>
             </a:fld>
             <a:endParaRPr lang="en-US"/>
           </a:p>
@@ -968,7 +966,7 @@
           <a:p>
             <a:fld id="{1C1BBDF2-9A12-4067-84DF-8DD5947A1DA9}" type="datetimeFigureOut">
               <a:rPr lang="en-US" smtClean="0"/>
-              <a:t>12/19/2024</a:t>
+              <a:t>12/21/2024</a:t>
             </a:fld>
             <a:endParaRPr lang="en-US"/>
           </a:p>
@@ -1176,7 +1174,7 @@
           <a:p>
             <a:fld id="{1C1BBDF2-9A12-4067-84DF-8DD5947A1DA9}" type="datetimeFigureOut">
               <a:rPr lang="en-US" smtClean="0"/>
-              <a:t>12/19/2024</a:t>
+              <a:t>12/21/2024</a:t>
             </a:fld>
             <a:endParaRPr lang="en-US"/>
           </a:p>
@@ -1374,7 +1372,7 @@
           <a:p>
             <a:fld id="{1C1BBDF2-9A12-4067-84DF-8DD5947A1DA9}" type="datetimeFigureOut">
               <a:rPr lang="en-US" smtClean="0"/>
-              <a:t>12/19/2024</a:t>
+              <a:t>12/21/2024</a:t>
             </a:fld>
             <a:endParaRPr lang="en-US"/>
           </a:p>
@@ -1649,7 +1647,7 @@
           <a:p>
             <a:fld id="{1C1BBDF2-9A12-4067-84DF-8DD5947A1DA9}" type="datetimeFigureOut">
               <a:rPr lang="en-US" smtClean="0"/>
-              <a:t>12/19/2024</a:t>
+              <a:t>12/21/2024</a:t>
             </a:fld>
             <a:endParaRPr lang="en-US"/>
           </a:p>
@@ -1914,7 +1912,7 @@
           <a:p>
             <a:fld id="{1C1BBDF2-9A12-4067-84DF-8DD5947A1DA9}" type="datetimeFigureOut">
               <a:rPr lang="en-US" smtClean="0"/>
-              <a:t>12/19/2024</a:t>
+              <a:t>12/21/2024</a:t>
             </a:fld>
             <a:endParaRPr lang="en-US"/>
           </a:p>
@@ -2326,7 +2324,7 @@
           <a:p>
             <a:fld id="{1C1BBDF2-9A12-4067-84DF-8DD5947A1DA9}" type="datetimeFigureOut">
               <a:rPr lang="en-US" smtClean="0"/>
-              <a:t>12/19/2024</a:t>
+              <a:t>12/21/2024</a:t>
             </a:fld>
             <a:endParaRPr lang="en-US"/>
           </a:p>
@@ -2467,7 +2465,7 @@
           <a:p>
             <a:fld id="{1C1BBDF2-9A12-4067-84DF-8DD5947A1DA9}" type="datetimeFigureOut">
               <a:rPr lang="en-US" smtClean="0"/>
-              <a:t>12/19/2024</a:t>
+              <a:t>12/21/2024</a:t>
             </a:fld>
             <a:endParaRPr lang="en-US"/>
           </a:p>
@@ -2580,7 +2578,7 @@
           <a:p>
             <a:fld id="{1C1BBDF2-9A12-4067-84DF-8DD5947A1DA9}" type="datetimeFigureOut">
               <a:rPr lang="en-US" smtClean="0"/>
-              <a:t>12/19/2024</a:t>
+              <a:t>12/21/2024</a:t>
             </a:fld>
             <a:endParaRPr lang="en-US"/>
           </a:p>
@@ -2891,7 +2889,7 @@
           <a:p>
             <a:fld id="{1C1BBDF2-9A12-4067-84DF-8DD5947A1DA9}" type="datetimeFigureOut">
               <a:rPr lang="en-US" smtClean="0"/>
-              <a:t>12/19/2024</a:t>
+              <a:t>12/21/2024</a:t>
             </a:fld>
             <a:endParaRPr lang="en-US"/>
           </a:p>
@@ -3179,7 +3177,7 @@
           <a:p>
             <a:fld id="{1C1BBDF2-9A12-4067-84DF-8DD5947A1DA9}" type="datetimeFigureOut">
               <a:rPr lang="en-US" smtClean="0"/>
-              <a:t>12/19/2024</a:t>
+              <a:t>12/21/2024</a:t>
             </a:fld>
             <a:endParaRPr lang="en-US"/>
           </a:p>
@@ -3420,7 +3418,7 @@
           <a:p>
             <a:fld id="{1C1BBDF2-9A12-4067-84DF-8DD5947A1DA9}" type="datetimeFigureOut">
               <a:rPr lang="en-US" smtClean="0"/>
-              <a:t>12/19/2024</a:t>
+              <a:t>12/21/2024</a:t>
             </a:fld>
             <a:endParaRPr lang="en-US"/>
           </a:p>
@@ -4075,6 +4073,42 @@
           <a:chExt cx="0" cy="0"/>
         </a:xfrm>
       </p:grpSpPr>
+      <p:pic>
+        <p:nvPicPr>
+          <p:cNvPr id="3" name="Picture 2" descr="A graph of a graph showing a number of different types of data&#10;&#10;Description automatically generated with medium confidence">
+            <a:extLst>
+              <a:ext uri="{FF2B5EF4-FFF2-40B4-BE49-F238E27FC236}">
+                <a16:creationId xmlns:a16="http://schemas.microsoft.com/office/drawing/2014/main" id="{1E738F8C-6B76-74F6-22AF-619CEDADCF11}"/>
+              </a:ext>
+            </a:extLst>
+          </p:cNvPr>
+          <p:cNvPicPr>
+            <a:picLocks noChangeAspect="1"/>
+          </p:cNvPicPr>
+          <p:nvPr/>
+        </p:nvPicPr>
+        <p:blipFill>
+          <a:blip r:embed="rId2">
+            <a:extLst>
+              <a:ext uri="{28A0092B-C50C-407E-A947-70E740481C1C}">
+                <a14:useLocalDpi xmlns:a14="http://schemas.microsoft.com/office/drawing/2010/main" val="0"/>
+              </a:ext>
+            </a:extLst>
+          </a:blip>
+          <a:stretch>
+            <a:fillRect/>
+          </a:stretch>
+        </p:blipFill>
+        <p:spPr>
+          <a:xfrm>
+            <a:off x="1981191" y="2057397"/>
+            <a:ext cx="8229617" cy="2743206"/>
+          </a:xfrm>
+          <a:prstGeom prst="rect">
+            <a:avLst/>
+          </a:prstGeom>
+        </p:spPr>
+      </p:pic>
     </p:spTree>
     <p:extLst>
       <p:ext uri="{BB962C8B-B14F-4D97-AF65-F5344CB8AC3E}">
@@ -4089,66 +4123,6 @@
 </file>
 
 <file path=ppt/slides/slide13.xml><?xml version="1.0" encoding="utf-8"?>
-<p:sld xmlns:a="http://schemas.openxmlformats.org/drawingml/2006/main" xmlns:r="http://schemas.openxmlformats.org/officeDocument/2006/relationships" xmlns:p="http://schemas.openxmlformats.org/presentationml/2006/main">
-  <p:cSld>
-    <p:spTree>
-      <p:nvGrpSpPr>
-        <p:cNvPr id="1" name=""/>
-        <p:cNvGrpSpPr/>
-        <p:nvPr/>
-      </p:nvGrpSpPr>
-      <p:grpSpPr>
-        <a:xfrm>
-          <a:off x="0" y="0"/>
-          <a:ext cx="0" cy="0"/>
-          <a:chOff x="0" y="0"/>
-          <a:chExt cx="0" cy="0"/>
-        </a:xfrm>
-      </p:grpSpPr>
-      <p:pic>
-        <p:nvPicPr>
-          <p:cNvPr id="7" name="Picture 6">
-            <a:extLst>
-              <a:ext uri="{FF2B5EF4-FFF2-40B4-BE49-F238E27FC236}">
-                <a16:creationId xmlns:a16="http://schemas.microsoft.com/office/drawing/2014/main" id="{2B74E20D-F07E-48F3-203B-C0100AA9E5EC}"/>
-              </a:ext>
-            </a:extLst>
-          </p:cNvPr>
-          <p:cNvPicPr>
-            <a:picLocks noChangeAspect="1"/>
-          </p:cNvPicPr>
-          <p:nvPr/>
-        </p:nvPicPr>
-        <p:blipFill>
-          <a:blip r:embed="rId2"/>
-          <a:stretch>
-            <a:fillRect/>
-          </a:stretch>
-        </p:blipFill>
-        <p:spPr>
-          <a:xfrm>
-            <a:off x="1587268" y="1644558"/>
-            <a:ext cx="9017463" cy="3568883"/>
-          </a:xfrm>
-          <a:prstGeom prst="rect">
-            <a:avLst/>
-          </a:prstGeom>
-        </p:spPr>
-      </p:pic>
-    </p:spTree>
-    <p:extLst>
-      <p:ext uri="{BB962C8B-B14F-4D97-AF65-F5344CB8AC3E}">
-        <p14:creationId xmlns:p14="http://schemas.microsoft.com/office/powerpoint/2010/main" val="1999209054"/>
-      </p:ext>
-    </p:extLst>
-  </p:cSld>
-  <p:clrMapOvr>
-    <a:masterClrMapping/>
-  </p:clrMapOvr>
-</p:sld>
-</file>
-
-<file path=ppt/slides/slide14.xml><?xml version="1.0" encoding="utf-8"?>
 <p:sld xmlns:a="http://schemas.openxmlformats.org/drawingml/2006/main" xmlns:r="http://schemas.openxmlformats.org/officeDocument/2006/relationships" xmlns:p="http://schemas.openxmlformats.org/presentationml/2006/main">
   <p:cSld>
     <p:spTree>
@@ -4219,7 +4193,7 @@
 </p:sld>
 </file>
 
-<file path=ppt/slides/slide15.xml><?xml version="1.0" encoding="utf-8"?>
+<file path=ppt/slides/slide14.xml><?xml version="1.0" encoding="utf-8"?>
 <p:sld xmlns:a="http://schemas.openxmlformats.org/drawingml/2006/main" xmlns:r="http://schemas.openxmlformats.org/officeDocument/2006/relationships" xmlns:p="http://schemas.openxmlformats.org/presentationml/2006/main">
   <p:cSld>
     <p:spTree>
@@ -4290,7 +4264,7 @@
 </p:sld>
 </file>
 
-<file path=ppt/slides/slide16.xml><?xml version="1.0" encoding="utf-8"?>
+<file path=ppt/slides/slide15.xml><?xml version="1.0" encoding="utf-8"?>
 <p:sld xmlns:a="http://schemas.openxmlformats.org/drawingml/2006/main" xmlns:r="http://schemas.openxmlformats.org/officeDocument/2006/relationships" xmlns:p="http://schemas.openxmlformats.org/presentationml/2006/main">
   <p:cSld>
     <p:spTree>
@@ -4356,7 +4330,7 @@
 </p:sld>
 </file>
 
-<file path=ppt/slides/slide17.xml><?xml version="1.0" encoding="utf-8"?>
+<file path=ppt/slides/slide16.xml><?xml version="1.0" encoding="utf-8"?>
 <p:sld xmlns:a="http://schemas.openxmlformats.org/drawingml/2006/main" xmlns:r="http://schemas.openxmlformats.org/officeDocument/2006/relationships" xmlns:p="http://schemas.openxmlformats.org/presentationml/2006/main">
   <p:cSld>
     <p:spTree>
@@ -4427,7 +4401,7 @@
 </p:sld>
 </file>
 
-<file path=ppt/slides/slide18.xml><?xml version="1.0" encoding="utf-8"?>
+<file path=ppt/slides/slide17.xml><?xml version="1.0" encoding="utf-8"?>
 <p:sld xmlns:a="http://schemas.openxmlformats.org/drawingml/2006/main" xmlns:r="http://schemas.openxmlformats.org/officeDocument/2006/relationships" xmlns:p="http://schemas.openxmlformats.org/presentationml/2006/main">
   <p:cSld>
     <p:bg>
@@ -4492,6 +4466,78 @@
     <p:extLst>
       <p:ext uri="{BB962C8B-B14F-4D97-AF65-F5344CB8AC3E}">
         <p14:creationId xmlns:p14="http://schemas.microsoft.com/office/powerpoint/2010/main" val="2098114903"/>
+      </p:ext>
+    </p:extLst>
+  </p:cSld>
+  <p:clrMapOvr>
+    <a:masterClrMapping/>
+  </p:clrMapOvr>
+</p:sld>
+</file>
+
+<file path=ppt/slides/slide18.xml><?xml version="1.0" encoding="utf-8"?>
+<p:sld xmlns:a="http://schemas.openxmlformats.org/drawingml/2006/main" xmlns:r="http://schemas.openxmlformats.org/officeDocument/2006/relationships" xmlns:p="http://schemas.openxmlformats.org/presentationml/2006/main">
+  <p:cSld>
+    <p:spTree>
+      <p:nvGrpSpPr>
+        <p:cNvPr id="1" name="">
+          <a:extLst>
+            <a:ext uri="{FF2B5EF4-FFF2-40B4-BE49-F238E27FC236}">
+              <a16:creationId xmlns:a16="http://schemas.microsoft.com/office/drawing/2014/main" id="{63F052C4-B740-3B75-4EE3-2F4EEA218213}"/>
+            </a:ext>
+          </a:extLst>
+        </p:cNvPr>
+        <p:cNvGrpSpPr/>
+        <p:nvPr/>
+      </p:nvGrpSpPr>
+      <p:grpSpPr>
+        <a:xfrm>
+          <a:off x="0" y="0"/>
+          <a:ext cx="0" cy="0"/>
+          <a:chOff x="0" y="0"/>
+          <a:chExt cx="0" cy="0"/>
+        </a:xfrm>
+      </p:grpSpPr>
+      <p:pic>
+        <p:nvPicPr>
+          <p:cNvPr id="3" name="Picture 2" descr="A graph of a graph&#10;&#10;Description automatically generated">
+            <a:extLst>
+              <a:ext uri="{FF2B5EF4-FFF2-40B4-BE49-F238E27FC236}">
+                <a16:creationId xmlns:a16="http://schemas.microsoft.com/office/drawing/2014/main" id="{21623C33-E24C-1596-4B88-8289AD96F518}"/>
+              </a:ext>
+            </a:extLst>
+          </p:cNvPr>
+          <p:cNvPicPr>
+            <a:picLocks noChangeAspect="1"/>
+          </p:cNvPicPr>
+          <p:nvPr/>
+        </p:nvPicPr>
+        <p:blipFill>
+          <a:blip r:embed="rId2">
+            <a:extLst>
+              <a:ext uri="{28A0092B-C50C-407E-A947-70E740481C1C}">
+                <a14:useLocalDpi xmlns:a14="http://schemas.microsoft.com/office/drawing/2010/main" val="0"/>
+              </a:ext>
+            </a:extLst>
+          </a:blip>
+          <a:stretch>
+            <a:fillRect/>
+          </a:stretch>
+        </p:blipFill>
+        <p:spPr>
+          <a:xfrm>
+            <a:off x="643467" y="1247985"/>
+            <a:ext cx="10905066" cy="4362028"/>
+          </a:xfrm>
+          <a:prstGeom prst="rect">
+            <a:avLst/>
+          </a:prstGeom>
+        </p:spPr>
+      </p:pic>
+    </p:spTree>
+    <p:extLst>
+      <p:ext uri="{BB962C8B-B14F-4D97-AF65-F5344CB8AC3E}">
+        <p14:creationId xmlns:p14="http://schemas.microsoft.com/office/powerpoint/2010/main" val="981264521"/>
       </p:ext>
     </p:extLst>
   </p:cSld>
@@ -4526,47 +4572,12 @@
           <a:chExt cx="0" cy="0"/>
         </a:xfrm>
       </p:grpSpPr>
-      <p:sp>
-        <p:nvSpPr>
-          <p:cNvPr id="6" name="TextBox 5">
-            <a:extLst>
-              <a:ext uri="{FF2B5EF4-FFF2-40B4-BE49-F238E27FC236}">
-                <a16:creationId xmlns:a16="http://schemas.microsoft.com/office/drawing/2014/main" id="{652BE46A-4154-A176-6EF5-46AF72373274}"/>
-              </a:ext>
-            </a:extLst>
-          </p:cNvPr>
-          <p:cNvSpPr txBox="1"/>
-          <p:nvPr/>
-        </p:nvSpPr>
-        <p:spPr>
-          <a:xfrm>
-            <a:off x="449943" y="264457"/>
-            <a:ext cx="2310825" cy="369332"/>
-          </a:xfrm>
-          <a:prstGeom prst="rect">
-            <a:avLst/>
-          </a:prstGeom>
-          <a:noFill/>
-        </p:spPr>
-        <p:txBody>
-          <a:bodyPr wrap="none" rtlCol="0">
-            <a:spAutoFit/>
-          </a:bodyPr>
-          <a:lstStyle/>
-          <a:p>
-            <a:r>
-              <a:rPr lang="en-US" dirty="0"/>
-              <a:t>Top 10 strategies only</a:t>
-            </a:r>
-          </a:p>
-        </p:txBody>
-      </p:sp>
       <p:pic>
         <p:nvPicPr>
-          <p:cNvPr id="3" name="Picture 2" descr="A graph of different colored lines&#10;&#10;Description automatically generated">
-            <a:extLst>
-              <a:ext uri="{FF2B5EF4-FFF2-40B4-BE49-F238E27FC236}">
-                <a16:creationId xmlns:a16="http://schemas.microsoft.com/office/drawing/2014/main" id="{4C837D83-22DC-512D-1707-2DAD8BE51A4F}"/>
+          <p:cNvPr id="3" name="Picture 2" descr="A graph of a graph&#10;&#10;Description automatically generated with medium confidence">
+            <a:extLst>
+              <a:ext uri="{FF2B5EF4-FFF2-40B4-BE49-F238E27FC236}">
+                <a16:creationId xmlns:a16="http://schemas.microsoft.com/office/drawing/2014/main" id="{1299CAF1-FA48-1D69-50A8-5A04A2B776A0}"/>
               </a:ext>
             </a:extLst>
           </p:cNvPr>
@@ -4589,8 +4600,8 @@
         </p:blipFill>
         <p:spPr>
           <a:xfrm>
-            <a:off x="3352794" y="1600196"/>
-            <a:ext cx="5486411" cy="3657607"/>
+            <a:off x="643467" y="1247985"/>
+            <a:ext cx="10905066" cy="4362028"/>
           </a:xfrm>
           <a:prstGeom prst="rect">
             <a:avLst/>
@@ -4600,7 +4611,7 @@
     </p:spTree>
     <p:extLst>
       <p:ext uri="{BB962C8B-B14F-4D97-AF65-F5344CB8AC3E}">
-        <p14:creationId xmlns:p14="http://schemas.microsoft.com/office/powerpoint/2010/main" val="2364121533"/>
+        <p14:creationId xmlns:p14="http://schemas.microsoft.com/office/powerpoint/2010/main" val="572464560"/>
       </p:ext>
     </p:extLst>
   </p:cSld>
@@ -4692,15 +4703,17 @@
 <file path=ppt/slides/slide20.xml><?xml version="1.0" encoding="utf-8"?>
 <p:sld xmlns:a="http://schemas.openxmlformats.org/drawingml/2006/main" xmlns:r="http://schemas.openxmlformats.org/officeDocument/2006/relationships" xmlns:p="http://schemas.openxmlformats.org/presentationml/2006/main">
   <p:cSld>
+    <p:bg>
+      <p:bgPr>
+        <a:solidFill>
+          <a:schemeClr val="bg1"/>
+        </a:solidFill>
+        <a:effectLst/>
+      </p:bgPr>
+    </p:bg>
     <p:spTree>
       <p:nvGrpSpPr>
-        <p:cNvPr id="1" name="">
-          <a:extLst>
-            <a:ext uri="{FF2B5EF4-FFF2-40B4-BE49-F238E27FC236}">
-              <a16:creationId xmlns:a16="http://schemas.microsoft.com/office/drawing/2014/main" id="{63F052C4-B740-3B75-4EE3-2F4EEA218213}"/>
-            </a:ext>
-          </a:extLst>
-        </p:cNvPr>
+        <p:cNvPr id="1" name=""/>
         <p:cNvGrpSpPr/>
         <p:nvPr/>
       </p:nvGrpSpPr>
@@ -4714,10 +4727,10 @@
       </p:grpSpPr>
       <p:pic>
         <p:nvPicPr>
-          <p:cNvPr id="3" name="Picture 2" descr="A graph of a graph&#10;&#10;Description automatically generated">
-            <a:extLst>
-              <a:ext uri="{FF2B5EF4-FFF2-40B4-BE49-F238E27FC236}">
-                <a16:creationId xmlns:a16="http://schemas.microsoft.com/office/drawing/2014/main" id="{21623C33-E24C-1596-4B88-8289AD96F518}"/>
+          <p:cNvPr id="3" name="Picture 2" descr="A graph with lines and numbers&#10;&#10;Description automatically generated">
+            <a:extLst>
+              <a:ext uri="{FF2B5EF4-FFF2-40B4-BE49-F238E27FC236}">
+                <a16:creationId xmlns:a16="http://schemas.microsoft.com/office/drawing/2014/main" id="{8B03AB49-15B7-9EB1-9AAA-DD4D97E3B81A}"/>
               </a:ext>
             </a:extLst>
           </p:cNvPr>
@@ -4751,7 +4764,7 @@
     </p:spTree>
     <p:extLst>
       <p:ext uri="{BB962C8B-B14F-4D97-AF65-F5344CB8AC3E}">
-        <p14:creationId xmlns:p14="http://schemas.microsoft.com/office/powerpoint/2010/main" val="981264521"/>
+        <p14:creationId xmlns:p14="http://schemas.microsoft.com/office/powerpoint/2010/main" val="1192567665"/>
       </p:ext>
     </p:extLst>
   </p:cSld>
@@ -4786,12 +4799,47 @@
           <a:chExt cx="0" cy="0"/>
         </a:xfrm>
       </p:grpSpPr>
+      <p:sp>
+        <p:nvSpPr>
+          <p:cNvPr id="6" name="TextBox 5">
+            <a:extLst>
+              <a:ext uri="{FF2B5EF4-FFF2-40B4-BE49-F238E27FC236}">
+                <a16:creationId xmlns:a16="http://schemas.microsoft.com/office/drawing/2014/main" id="{652BE46A-4154-A176-6EF5-46AF72373274}"/>
+              </a:ext>
+            </a:extLst>
+          </p:cNvPr>
+          <p:cNvSpPr txBox="1"/>
+          <p:nvPr/>
+        </p:nvSpPr>
+        <p:spPr>
+          <a:xfrm>
+            <a:off x="449943" y="264457"/>
+            <a:ext cx="2310825" cy="369332"/>
+          </a:xfrm>
+          <a:prstGeom prst="rect">
+            <a:avLst/>
+          </a:prstGeom>
+          <a:noFill/>
+        </p:spPr>
+        <p:txBody>
+          <a:bodyPr wrap="none" rtlCol="0">
+            <a:spAutoFit/>
+          </a:bodyPr>
+          <a:lstStyle/>
+          <a:p>
+            <a:r>
+              <a:rPr lang="en-US" dirty="0"/>
+              <a:t>Top 10 strategies only</a:t>
+            </a:r>
+          </a:p>
+        </p:txBody>
+      </p:sp>
       <p:pic>
         <p:nvPicPr>
-          <p:cNvPr id="3" name="Picture 2" descr="A graph of a graph&#10;&#10;Description automatically generated with medium confidence">
-            <a:extLst>
-              <a:ext uri="{FF2B5EF4-FFF2-40B4-BE49-F238E27FC236}">
-                <a16:creationId xmlns:a16="http://schemas.microsoft.com/office/drawing/2014/main" id="{1299CAF1-FA48-1D69-50A8-5A04A2B776A0}"/>
+          <p:cNvPr id="3" name="Picture 2" descr="A graph of different colored lines&#10;&#10;Description automatically generated">
+            <a:extLst>
+              <a:ext uri="{FF2B5EF4-FFF2-40B4-BE49-F238E27FC236}">
+                <a16:creationId xmlns:a16="http://schemas.microsoft.com/office/drawing/2014/main" id="{4C837D83-22DC-512D-1707-2DAD8BE51A4F}"/>
               </a:ext>
             </a:extLst>
           </p:cNvPr>
@@ -4814,8 +4862,8 @@
         </p:blipFill>
         <p:spPr>
           <a:xfrm>
-            <a:off x="643467" y="1247985"/>
-            <a:ext cx="10905066" cy="4362028"/>
+            <a:off x="3352794" y="1600196"/>
+            <a:ext cx="5486411" cy="3657607"/>
           </a:xfrm>
           <a:prstGeom prst="rect">
             <a:avLst/>
@@ -4825,81 +4873,7 @@
     </p:spTree>
     <p:extLst>
       <p:ext uri="{BB962C8B-B14F-4D97-AF65-F5344CB8AC3E}">
-        <p14:creationId xmlns:p14="http://schemas.microsoft.com/office/powerpoint/2010/main" val="572464560"/>
-      </p:ext>
-    </p:extLst>
-  </p:cSld>
-  <p:clrMapOvr>
-    <a:masterClrMapping/>
-  </p:clrMapOvr>
-</p:sld>
-</file>
-
-<file path=ppt/slides/slide22.xml><?xml version="1.0" encoding="utf-8"?>
-<p:sld xmlns:a="http://schemas.openxmlformats.org/drawingml/2006/main" xmlns:r="http://schemas.openxmlformats.org/officeDocument/2006/relationships" xmlns:p="http://schemas.openxmlformats.org/presentationml/2006/main">
-  <p:cSld>
-    <p:bg>
-      <p:bgPr>
-        <a:solidFill>
-          <a:schemeClr val="bg1"/>
-        </a:solidFill>
-        <a:effectLst/>
-      </p:bgPr>
-    </p:bg>
-    <p:spTree>
-      <p:nvGrpSpPr>
-        <p:cNvPr id="1" name=""/>
-        <p:cNvGrpSpPr/>
-        <p:nvPr/>
-      </p:nvGrpSpPr>
-      <p:grpSpPr>
-        <a:xfrm>
-          <a:off x="0" y="0"/>
-          <a:ext cx="0" cy="0"/>
-          <a:chOff x="0" y="0"/>
-          <a:chExt cx="0" cy="0"/>
-        </a:xfrm>
-      </p:grpSpPr>
-      <p:pic>
-        <p:nvPicPr>
-          <p:cNvPr id="3" name="Picture 2" descr="A graph with lines and numbers&#10;&#10;Description automatically generated">
-            <a:extLst>
-              <a:ext uri="{FF2B5EF4-FFF2-40B4-BE49-F238E27FC236}">
-                <a16:creationId xmlns:a16="http://schemas.microsoft.com/office/drawing/2014/main" id="{8B03AB49-15B7-9EB1-9AAA-DD4D97E3B81A}"/>
-              </a:ext>
-            </a:extLst>
-          </p:cNvPr>
-          <p:cNvPicPr>
-            <a:picLocks noChangeAspect="1"/>
-          </p:cNvPicPr>
-          <p:nvPr/>
-        </p:nvPicPr>
-        <p:blipFill>
-          <a:blip r:embed="rId2">
-            <a:extLst>
-              <a:ext uri="{28A0092B-C50C-407E-A947-70E740481C1C}">
-                <a14:useLocalDpi xmlns:a14="http://schemas.microsoft.com/office/drawing/2010/main" val="0"/>
-              </a:ext>
-            </a:extLst>
-          </a:blip>
-          <a:stretch>
-            <a:fillRect/>
-          </a:stretch>
-        </p:blipFill>
-        <p:spPr>
-          <a:xfrm>
-            <a:off x="643467" y="1247985"/>
-            <a:ext cx="10905066" cy="4362028"/>
-          </a:xfrm>
-          <a:prstGeom prst="rect">
-            <a:avLst/>
-          </a:prstGeom>
-        </p:spPr>
-      </p:pic>
-    </p:spTree>
-    <p:extLst>
-      <p:ext uri="{BB962C8B-B14F-4D97-AF65-F5344CB8AC3E}">
-        <p14:creationId xmlns:p14="http://schemas.microsoft.com/office/powerpoint/2010/main" val="1192567665"/>
+        <p14:creationId xmlns:p14="http://schemas.microsoft.com/office/powerpoint/2010/main" val="2364121533"/>
       </p:ext>
     </p:extLst>
   </p:cSld>

</xml_diff>